<commit_message>
:memo: Ajout partie MCTS
</commit_message>
<xml_diff>
--- a/report/Renforcement Learning sur Super Mario Bros.pptx
+++ b/report/Renforcement Learning sur Super Mario Bros.pptx
@@ -19,6 +19,10 @@
     <p:sldId id="267" r:id="rId13"/>
     <p:sldId id="268" r:id="rId14"/>
     <p:sldId id="269" r:id="rId15"/>
+    <p:sldId id="270" r:id="rId16"/>
+    <p:sldId id="272" r:id="rId17"/>
+    <p:sldId id="273" r:id="rId18"/>
+    <p:sldId id="271" r:id="rId19"/>
   </p:sldIdLst>
   <p:sldSz cx="12192000" cy="6858000"/>
   <p:notesSz cx="6858000" cy="9144000"/>
@@ -117,6 +121,11 @@
       </a:defRPr>
     </a:lvl9pPr>
   </p:defaultTextStyle>
+  <p:extLst>
+    <p:ext uri="{EFAFB233-063F-42B5-8137-9DF3F51BA10A}">
+      <p15:sldGuideLst xmlns:p15="http://schemas.microsoft.com/office/powerpoint/2012/main"/>
+    </p:ext>
+  </p:extLst>
 </p:presentation>
 </file>
 
@@ -4002,7 +4011,7 @@
           <a:p>
             <a:fld id="{5445F93E-4F2C-4DBB-8195-1C53AEDFA418}" type="datetimeFigureOut">
               <a:rPr lang="fr-FR" smtClean="0"/>
-              <a:t>23/10/2024</a:t>
+              <a:t>31/10/2024</a:t>
             </a:fld>
             <a:endParaRPr lang="fr-FR"/>
           </a:p>
@@ -4200,7 +4209,7 @@
           <a:p>
             <a:fld id="{5445F93E-4F2C-4DBB-8195-1C53AEDFA418}" type="datetimeFigureOut">
               <a:rPr lang="fr-FR" smtClean="0"/>
-              <a:t>23/10/2024</a:t>
+              <a:t>31/10/2024</a:t>
             </a:fld>
             <a:endParaRPr lang="fr-FR"/>
           </a:p>
@@ -4408,7 +4417,7 @@
           <a:p>
             <a:fld id="{5445F93E-4F2C-4DBB-8195-1C53AEDFA418}" type="datetimeFigureOut">
               <a:rPr lang="fr-FR" smtClean="0"/>
-              <a:t>23/10/2024</a:t>
+              <a:t>31/10/2024</a:t>
             </a:fld>
             <a:endParaRPr lang="fr-FR"/>
           </a:p>
@@ -4606,7 +4615,7 @@
           <a:p>
             <a:fld id="{5445F93E-4F2C-4DBB-8195-1C53AEDFA418}" type="datetimeFigureOut">
               <a:rPr lang="fr-FR" smtClean="0"/>
-              <a:t>23/10/2024</a:t>
+              <a:t>31/10/2024</a:t>
             </a:fld>
             <a:endParaRPr lang="fr-FR"/>
           </a:p>
@@ -4881,7 +4890,7 @@
           <a:p>
             <a:fld id="{5445F93E-4F2C-4DBB-8195-1C53AEDFA418}" type="datetimeFigureOut">
               <a:rPr lang="fr-FR" smtClean="0"/>
-              <a:t>23/10/2024</a:t>
+              <a:t>31/10/2024</a:t>
             </a:fld>
             <a:endParaRPr lang="fr-FR"/>
           </a:p>
@@ -5146,7 +5155,7 @@
           <a:p>
             <a:fld id="{5445F93E-4F2C-4DBB-8195-1C53AEDFA418}" type="datetimeFigureOut">
               <a:rPr lang="fr-FR" smtClean="0"/>
-              <a:t>23/10/2024</a:t>
+              <a:t>31/10/2024</a:t>
             </a:fld>
             <a:endParaRPr lang="fr-FR"/>
           </a:p>
@@ -5558,7 +5567,7 @@
           <a:p>
             <a:fld id="{5445F93E-4F2C-4DBB-8195-1C53AEDFA418}" type="datetimeFigureOut">
               <a:rPr lang="fr-FR" smtClean="0"/>
-              <a:t>23/10/2024</a:t>
+              <a:t>31/10/2024</a:t>
             </a:fld>
             <a:endParaRPr lang="fr-FR"/>
           </a:p>
@@ -5699,7 +5708,7 @@
           <a:p>
             <a:fld id="{5445F93E-4F2C-4DBB-8195-1C53AEDFA418}" type="datetimeFigureOut">
               <a:rPr lang="fr-FR" smtClean="0"/>
-              <a:t>23/10/2024</a:t>
+              <a:t>31/10/2024</a:t>
             </a:fld>
             <a:endParaRPr lang="fr-FR"/>
           </a:p>
@@ -5812,7 +5821,7 @@
           <a:p>
             <a:fld id="{5445F93E-4F2C-4DBB-8195-1C53AEDFA418}" type="datetimeFigureOut">
               <a:rPr lang="fr-FR" smtClean="0"/>
-              <a:t>23/10/2024</a:t>
+              <a:t>31/10/2024</a:t>
             </a:fld>
             <a:endParaRPr lang="fr-FR"/>
           </a:p>
@@ -6123,7 +6132,7 @@
           <a:p>
             <a:fld id="{5445F93E-4F2C-4DBB-8195-1C53AEDFA418}" type="datetimeFigureOut">
               <a:rPr lang="fr-FR" smtClean="0"/>
-              <a:t>23/10/2024</a:t>
+              <a:t>31/10/2024</a:t>
             </a:fld>
             <a:endParaRPr lang="fr-FR"/>
           </a:p>
@@ -6411,7 +6420,7 @@
           <a:p>
             <a:fld id="{5445F93E-4F2C-4DBB-8195-1C53AEDFA418}" type="datetimeFigureOut">
               <a:rPr lang="fr-FR" smtClean="0"/>
-              <a:t>23/10/2024</a:t>
+              <a:t>31/10/2024</a:t>
             </a:fld>
             <a:endParaRPr lang="fr-FR"/>
           </a:p>
@@ -6652,7 +6661,7 @@
           <a:p>
             <a:fld id="{5445F93E-4F2C-4DBB-8195-1C53AEDFA418}" type="datetimeFigureOut">
               <a:rPr lang="fr-FR" smtClean="0"/>
-              <a:t>23/10/2024</a:t>
+              <a:t>31/10/2024</a:t>
             </a:fld>
             <a:endParaRPr lang="fr-FR"/>
           </a:p>
@@ -8892,8 +8901,8 @@
           </a:fontRef>
         </p:style>
       </p:cxnSp>
-      <mc:AlternateContent xmlns:mc="http://schemas.openxmlformats.org/markup-compatibility/2006">
-        <mc:Choice xmlns:a14="http://schemas.microsoft.com/office/drawing/2010/main" Requires="a14">
+      <mc:AlternateContent xmlns:mc="http://schemas.openxmlformats.org/markup-compatibility/2006" xmlns:a14="http://schemas.microsoft.com/office/drawing/2010/main">
+        <mc:Choice Requires="a14">
           <p:sp>
             <p:nvSpPr>
               <p:cNvPr id="3" name="ZoneTexte 2">
@@ -9340,7 +9349,7 @@
             </p:txBody>
           </p:sp>
         </mc:Choice>
-        <mc:Fallback>
+        <mc:Fallback xmlns="">
           <p:sp>
             <p:nvSpPr>
               <p:cNvPr id="3" name="ZoneTexte 2">
@@ -9385,8 +9394,8 @@
           </p:sp>
         </mc:Fallback>
       </mc:AlternateContent>
-      <mc:AlternateContent xmlns:mc="http://schemas.openxmlformats.org/markup-compatibility/2006">
-        <mc:Choice xmlns:a14="http://schemas.microsoft.com/office/drawing/2010/main" Requires="a14">
+      <mc:AlternateContent xmlns:mc="http://schemas.openxmlformats.org/markup-compatibility/2006" xmlns:a14="http://schemas.microsoft.com/office/drawing/2010/main">
+        <mc:Choice Requires="a14">
           <p:sp>
             <p:nvSpPr>
               <p:cNvPr id="8" name="ZoneTexte 7">
@@ -9757,7 +9766,7 @@
             </p:txBody>
           </p:sp>
         </mc:Choice>
-        <mc:Fallback>
+        <mc:Fallback xmlns="">
           <p:sp>
             <p:nvSpPr>
               <p:cNvPr id="8" name="ZoneTexte 7">
@@ -9845,6 +9854,1036 @@
     <p:extLst>
       <p:ext uri="{BB962C8B-B14F-4D97-AF65-F5344CB8AC3E}">
         <p14:creationId xmlns:p14="http://schemas.microsoft.com/office/powerpoint/2010/main" val="3701482528"/>
+      </p:ext>
+    </p:extLst>
+  </p:cSld>
+  <p:clrMapOvr>
+    <a:masterClrMapping/>
+  </p:clrMapOvr>
+</p:sld>
+</file>
+
+<file path=ppt/slides/slide15.xml><?xml version="1.0" encoding="utf-8"?>
+<p:sld xmlns:a="http://schemas.openxmlformats.org/drawingml/2006/main" xmlns:r="http://schemas.openxmlformats.org/officeDocument/2006/relationships" xmlns:p="http://schemas.openxmlformats.org/presentationml/2006/main">
+  <p:cSld>
+    <p:spTree>
+      <p:nvGrpSpPr>
+        <p:cNvPr id="1" name="">
+          <a:extLst>
+            <a:ext uri="{FF2B5EF4-FFF2-40B4-BE49-F238E27FC236}">
+              <a16:creationId xmlns:a16="http://schemas.microsoft.com/office/drawing/2014/main" id="{429D2AA8-702F-0504-133E-DC88F91408B0}"/>
+            </a:ext>
+          </a:extLst>
+        </p:cNvPr>
+        <p:cNvGrpSpPr/>
+        <p:nvPr/>
+      </p:nvGrpSpPr>
+      <p:grpSpPr>
+        <a:xfrm>
+          <a:off x="0" y="0"/>
+          <a:ext cx="0" cy="0"/>
+          <a:chOff x="0" y="0"/>
+          <a:chExt cx="0" cy="0"/>
+        </a:xfrm>
+      </p:grpSpPr>
+      <p:sp>
+        <p:nvSpPr>
+          <p:cNvPr id="2" name="Titre 1">
+            <a:extLst>
+              <a:ext uri="{FF2B5EF4-FFF2-40B4-BE49-F238E27FC236}">
+                <a16:creationId xmlns:a16="http://schemas.microsoft.com/office/drawing/2014/main" id="{9F055138-49B3-C3B9-2E2A-BBA1649099B8}"/>
+              </a:ext>
+            </a:extLst>
+          </p:cNvPr>
+          <p:cNvSpPr>
+            <a:spLocks noGrp="1"/>
+          </p:cNvSpPr>
+          <p:nvPr>
+            <p:ph type="title"/>
+          </p:nvPr>
+        </p:nvSpPr>
+        <p:spPr>
+          <a:xfrm>
+            <a:off x="520045" y="355698"/>
+            <a:ext cx="10515600" cy="1325563"/>
+          </a:xfrm>
+        </p:spPr>
+        <p:txBody>
+          <a:bodyPr/>
+          <a:lstStyle/>
+          <a:p>
+            <a:r>
+              <a:rPr lang="en-US" b="1" dirty="0">
+                <a:latin typeface="Aharoni" panose="02010803020104030203" pitchFamily="2" charset="-79"/>
+                <a:cs typeface="Aharoni" panose="02010803020104030203" pitchFamily="2" charset="-79"/>
+              </a:rPr>
+              <a:t>MCTS</a:t>
+            </a:r>
+            <a:endParaRPr lang="fr-FR" b="1" dirty="0">
+              <a:latin typeface="Aharoni" panose="02010803020104030203" pitchFamily="2" charset="-79"/>
+              <a:cs typeface="Aharoni" panose="02010803020104030203" pitchFamily="2" charset="-79"/>
+            </a:endParaRPr>
+          </a:p>
+        </p:txBody>
+      </p:sp>
+      <p:cxnSp>
+        <p:nvCxnSpPr>
+          <p:cNvPr id="4" name="Connecteur droit 3">
+            <a:extLst>
+              <a:ext uri="{FF2B5EF4-FFF2-40B4-BE49-F238E27FC236}">
+                <a16:creationId xmlns:a16="http://schemas.microsoft.com/office/drawing/2014/main" id="{1F7041F0-D5E1-420D-CB1F-F04C7369506A}"/>
+              </a:ext>
+            </a:extLst>
+          </p:cNvPr>
+          <p:cNvCxnSpPr/>
+          <p:nvPr/>
+        </p:nvCxnSpPr>
+        <p:spPr>
+          <a:xfrm>
+            <a:off x="520045" y="1329180"/>
+            <a:ext cx="11151909" cy="0"/>
+          </a:xfrm>
+          <a:prstGeom prst="line">
+            <a:avLst/>
+          </a:prstGeom>
+          <a:ln w="19050"/>
+        </p:spPr>
+        <p:style>
+          <a:lnRef idx="1">
+            <a:schemeClr val="accent1"/>
+          </a:lnRef>
+          <a:fillRef idx="0">
+            <a:schemeClr val="accent1"/>
+          </a:fillRef>
+          <a:effectRef idx="0">
+            <a:schemeClr val="accent1"/>
+          </a:effectRef>
+          <a:fontRef idx="minor">
+            <a:schemeClr val="tx1"/>
+          </a:fontRef>
+        </p:style>
+      </p:cxnSp>
+      <p:sp>
+        <p:nvSpPr>
+          <p:cNvPr id="5" name="ZoneTexte 4">
+            <a:extLst>
+              <a:ext uri="{FF2B5EF4-FFF2-40B4-BE49-F238E27FC236}">
+                <a16:creationId xmlns:a16="http://schemas.microsoft.com/office/drawing/2014/main" id="{9F9A0EB9-96BA-61E6-3081-BF12D1B94848}"/>
+              </a:ext>
+            </a:extLst>
+          </p:cNvPr>
+          <p:cNvSpPr txBox="1"/>
+          <p:nvPr/>
+        </p:nvSpPr>
+        <p:spPr>
+          <a:xfrm>
+            <a:off x="520044" y="1681261"/>
+            <a:ext cx="8846205" cy="3170099"/>
+          </a:xfrm>
+          <a:prstGeom prst="rect">
+            <a:avLst/>
+          </a:prstGeom>
+          <a:noFill/>
+        </p:spPr>
+        <p:txBody>
+          <a:bodyPr wrap="square" rtlCol="0">
+            <a:spAutoFit/>
+          </a:bodyPr>
+          <a:lstStyle/>
+          <a:p>
+            <a:pPr marL="285750" indent="-285750">
+              <a:spcAft>
+                <a:spcPts val="2400"/>
+              </a:spcAft>
+              <a:buFont typeface="Arial" panose="020B0604020202020204" pitchFamily="34" charset="0"/>
+              <a:buChar char="•"/>
+            </a:pPr>
+            <a:r>
+              <a:rPr lang="fr-FR" sz="2000" dirty="0"/>
+              <a:t>Algorithme d’exploration et d’optimisation utilisé pour les jeux et problèmes de décision complexe</a:t>
+            </a:r>
+          </a:p>
+          <a:p>
+            <a:pPr marL="285750" indent="-285750">
+              <a:spcAft>
+                <a:spcPts val="2400"/>
+              </a:spcAft>
+              <a:buFont typeface="Arial" panose="020B0604020202020204" pitchFamily="34" charset="0"/>
+              <a:buChar char="•"/>
+            </a:pPr>
+            <a:r>
+              <a:rPr lang="fr-FR" sz="2000" dirty="0"/>
+              <a:t>Combine la recherche aléatoire et l’optimisation pour explorer efficacement les espaces d’actions vastes</a:t>
+            </a:r>
+          </a:p>
+          <a:p>
+            <a:pPr marL="285750" indent="-285750">
+              <a:spcAft>
+                <a:spcPts val="2400"/>
+              </a:spcAft>
+              <a:buFont typeface="Arial" panose="020B0604020202020204" pitchFamily="34" charset="0"/>
+              <a:buChar char="•"/>
+            </a:pPr>
+            <a:r>
+              <a:rPr lang="fr-FR" sz="2000" dirty="0"/>
+              <a:t>Construit un arbre de décision basé sur des simulations pour déterminer les meilleurs actions en fonction des résultats passés</a:t>
+            </a:r>
+          </a:p>
+          <a:p>
+            <a:pPr marL="285750" indent="-285750">
+              <a:spcAft>
+                <a:spcPts val="2400"/>
+              </a:spcAft>
+              <a:buFont typeface="Arial" panose="020B0604020202020204" pitchFamily="34" charset="0"/>
+              <a:buChar char="•"/>
+            </a:pPr>
+            <a:r>
+              <a:rPr lang="fr-FR" sz="2000" dirty="0"/>
+              <a:t>Utilisation : Sélection, Expansion, Simulation, Back propagation</a:t>
+            </a:r>
+          </a:p>
+        </p:txBody>
+      </p:sp>
+    </p:spTree>
+    <p:extLst>
+      <p:ext uri="{BB962C8B-B14F-4D97-AF65-F5344CB8AC3E}">
+        <p14:creationId xmlns:p14="http://schemas.microsoft.com/office/powerpoint/2010/main" val="3334383466"/>
+      </p:ext>
+    </p:extLst>
+  </p:cSld>
+  <p:clrMapOvr>
+    <a:masterClrMapping/>
+  </p:clrMapOvr>
+</p:sld>
+</file>
+
+<file path=ppt/slides/slide16.xml><?xml version="1.0" encoding="utf-8"?>
+<p:sld xmlns:a="http://schemas.openxmlformats.org/drawingml/2006/main" xmlns:r="http://schemas.openxmlformats.org/officeDocument/2006/relationships" xmlns:p="http://schemas.openxmlformats.org/presentationml/2006/main">
+  <p:cSld>
+    <p:spTree>
+      <p:nvGrpSpPr>
+        <p:cNvPr id="1" name="">
+          <a:extLst>
+            <a:ext uri="{FF2B5EF4-FFF2-40B4-BE49-F238E27FC236}">
+              <a16:creationId xmlns:a16="http://schemas.microsoft.com/office/drawing/2014/main" id="{1DF98E63-B563-D562-4202-83EC4317D70D}"/>
+            </a:ext>
+          </a:extLst>
+        </p:cNvPr>
+        <p:cNvGrpSpPr/>
+        <p:nvPr/>
+      </p:nvGrpSpPr>
+      <p:grpSpPr>
+        <a:xfrm>
+          <a:off x="0" y="0"/>
+          <a:ext cx="0" cy="0"/>
+          <a:chOff x="0" y="0"/>
+          <a:chExt cx="0" cy="0"/>
+        </a:xfrm>
+      </p:grpSpPr>
+      <p:sp>
+        <p:nvSpPr>
+          <p:cNvPr id="2" name="Titre 1">
+            <a:extLst>
+              <a:ext uri="{FF2B5EF4-FFF2-40B4-BE49-F238E27FC236}">
+                <a16:creationId xmlns:a16="http://schemas.microsoft.com/office/drawing/2014/main" id="{1343001C-A735-7D31-F72A-6A347CDF4D6E}"/>
+              </a:ext>
+            </a:extLst>
+          </p:cNvPr>
+          <p:cNvSpPr>
+            <a:spLocks noGrp="1"/>
+          </p:cNvSpPr>
+          <p:nvPr>
+            <p:ph type="title"/>
+          </p:nvPr>
+        </p:nvSpPr>
+        <p:spPr>
+          <a:xfrm>
+            <a:off x="520045" y="355698"/>
+            <a:ext cx="10515600" cy="1325563"/>
+          </a:xfrm>
+        </p:spPr>
+        <p:txBody>
+          <a:bodyPr/>
+          <a:lstStyle/>
+          <a:p>
+            <a:r>
+              <a:rPr lang="en-US" b="1" dirty="0">
+                <a:latin typeface="Aharoni" panose="02010803020104030203" pitchFamily="2" charset="-79"/>
+                <a:cs typeface="Aharoni" panose="02010803020104030203" pitchFamily="2" charset="-79"/>
+              </a:rPr>
+              <a:t>Application de MCTS dans le Jeu</a:t>
+            </a:r>
+            <a:endParaRPr lang="fr-FR" b="1" dirty="0">
+              <a:latin typeface="Aharoni" panose="02010803020104030203" pitchFamily="2" charset="-79"/>
+              <a:cs typeface="Aharoni" panose="02010803020104030203" pitchFamily="2" charset="-79"/>
+            </a:endParaRPr>
+          </a:p>
+        </p:txBody>
+      </p:sp>
+      <p:cxnSp>
+        <p:nvCxnSpPr>
+          <p:cNvPr id="4" name="Connecteur droit 3">
+            <a:extLst>
+              <a:ext uri="{FF2B5EF4-FFF2-40B4-BE49-F238E27FC236}">
+                <a16:creationId xmlns:a16="http://schemas.microsoft.com/office/drawing/2014/main" id="{FE48F075-C0BA-0470-EA58-BE686C9F7DAE}"/>
+              </a:ext>
+            </a:extLst>
+          </p:cNvPr>
+          <p:cNvCxnSpPr/>
+          <p:nvPr/>
+        </p:nvCxnSpPr>
+        <p:spPr>
+          <a:xfrm>
+            <a:off x="520045" y="1329180"/>
+            <a:ext cx="11151909" cy="0"/>
+          </a:xfrm>
+          <a:prstGeom prst="line">
+            <a:avLst/>
+          </a:prstGeom>
+          <a:ln w="19050"/>
+        </p:spPr>
+        <p:style>
+          <a:lnRef idx="1">
+            <a:schemeClr val="accent1"/>
+          </a:lnRef>
+          <a:fillRef idx="0">
+            <a:schemeClr val="accent1"/>
+          </a:fillRef>
+          <a:effectRef idx="0">
+            <a:schemeClr val="accent1"/>
+          </a:effectRef>
+          <a:fontRef idx="minor">
+            <a:schemeClr val="tx1"/>
+          </a:fontRef>
+        </p:style>
+      </p:cxnSp>
+      <p:sp>
+        <p:nvSpPr>
+          <p:cNvPr id="5" name="ZoneTexte 4">
+            <a:extLst>
+              <a:ext uri="{FF2B5EF4-FFF2-40B4-BE49-F238E27FC236}">
+                <a16:creationId xmlns:a16="http://schemas.microsoft.com/office/drawing/2014/main" id="{D396256E-3B67-43AC-626A-542D039115FC}"/>
+              </a:ext>
+            </a:extLst>
+          </p:cNvPr>
+          <p:cNvSpPr txBox="1"/>
+          <p:nvPr/>
+        </p:nvSpPr>
+        <p:spPr>
+          <a:xfrm>
+            <a:off x="520044" y="1681261"/>
+            <a:ext cx="8846205" cy="2554545"/>
+          </a:xfrm>
+          <a:prstGeom prst="rect">
+            <a:avLst/>
+          </a:prstGeom>
+          <a:noFill/>
+        </p:spPr>
+        <p:txBody>
+          <a:bodyPr wrap="square" rtlCol="0">
+            <a:spAutoFit/>
+          </a:bodyPr>
+          <a:lstStyle/>
+          <a:p>
+            <a:pPr marL="285750" indent="-285750">
+              <a:spcAft>
+                <a:spcPts val="2400"/>
+              </a:spcAft>
+              <a:buFont typeface="Arial" panose="020B0604020202020204" pitchFamily="34" charset="0"/>
+              <a:buChar char="•"/>
+            </a:pPr>
+            <a:r>
+              <a:rPr lang="fr-FR" sz="2000" dirty="0"/>
+              <a:t>Objectif : faire de la prise de décision pour le joueur, qui peut avancer ou sauter sur une grille.</a:t>
+            </a:r>
+          </a:p>
+          <a:p>
+            <a:pPr marL="285750" indent="-285750">
+              <a:spcAft>
+                <a:spcPts val="2400"/>
+              </a:spcAft>
+              <a:buFont typeface="Arial" panose="020B0604020202020204" pitchFamily="34" charset="0"/>
+              <a:buChar char="•"/>
+            </a:pPr>
+            <a:r>
+              <a:rPr lang="fr-FR" sz="2000" dirty="0"/>
+              <a:t>Processus</a:t>
+            </a:r>
+          </a:p>
+          <a:p>
+            <a:pPr marL="285750" indent="-285750">
+              <a:spcAft>
+                <a:spcPts val="2400"/>
+              </a:spcAft>
+              <a:buFont typeface="Arial" panose="020B0604020202020204" pitchFamily="34" charset="0"/>
+              <a:buChar char="•"/>
+            </a:pPr>
+            <a:r>
+              <a:rPr lang="fr-FR" sz="2000" dirty="0"/>
+              <a:t>Arbre de décisions</a:t>
+            </a:r>
+          </a:p>
+          <a:p>
+            <a:pPr marL="285750" indent="-285750">
+              <a:spcAft>
+                <a:spcPts val="2400"/>
+              </a:spcAft>
+              <a:buFont typeface="Arial" panose="020B0604020202020204" pitchFamily="34" charset="0"/>
+              <a:buChar char="•"/>
+            </a:pPr>
+            <a:r>
+              <a:rPr lang="fr-FR" sz="2000" dirty="0"/>
+              <a:t>Bénéfices</a:t>
+            </a:r>
+          </a:p>
+        </p:txBody>
+      </p:sp>
+    </p:spTree>
+    <p:extLst>
+      <p:ext uri="{BB962C8B-B14F-4D97-AF65-F5344CB8AC3E}">
+        <p14:creationId xmlns:p14="http://schemas.microsoft.com/office/powerpoint/2010/main" val="4118171432"/>
+      </p:ext>
+    </p:extLst>
+  </p:cSld>
+  <p:clrMapOvr>
+    <a:masterClrMapping/>
+  </p:clrMapOvr>
+</p:sld>
+</file>
+
+<file path=ppt/slides/slide17.xml><?xml version="1.0" encoding="utf-8"?>
+<p:sld xmlns:a="http://schemas.openxmlformats.org/drawingml/2006/main" xmlns:r="http://schemas.openxmlformats.org/officeDocument/2006/relationships" xmlns:p="http://schemas.openxmlformats.org/presentationml/2006/main">
+  <p:cSld>
+    <p:spTree>
+      <p:nvGrpSpPr>
+        <p:cNvPr id="1" name="">
+          <a:extLst>
+            <a:ext uri="{FF2B5EF4-FFF2-40B4-BE49-F238E27FC236}">
+              <a16:creationId xmlns:a16="http://schemas.microsoft.com/office/drawing/2014/main" id="{CD281F2F-7836-61D3-E759-888FD10355D2}"/>
+            </a:ext>
+          </a:extLst>
+        </p:cNvPr>
+        <p:cNvGrpSpPr/>
+        <p:nvPr/>
+      </p:nvGrpSpPr>
+      <p:grpSpPr>
+        <a:xfrm>
+          <a:off x="0" y="0"/>
+          <a:ext cx="0" cy="0"/>
+          <a:chOff x="0" y="0"/>
+          <a:chExt cx="0" cy="0"/>
+        </a:xfrm>
+      </p:grpSpPr>
+      <p:sp>
+        <p:nvSpPr>
+          <p:cNvPr id="2" name="Titre 1">
+            <a:extLst>
+              <a:ext uri="{FF2B5EF4-FFF2-40B4-BE49-F238E27FC236}">
+                <a16:creationId xmlns:a16="http://schemas.microsoft.com/office/drawing/2014/main" id="{7FAD02F8-D306-5683-C2F2-998B7ED78D9E}"/>
+              </a:ext>
+            </a:extLst>
+          </p:cNvPr>
+          <p:cNvSpPr>
+            <a:spLocks noGrp="1"/>
+          </p:cNvSpPr>
+          <p:nvPr>
+            <p:ph type="title"/>
+          </p:nvPr>
+        </p:nvSpPr>
+        <p:spPr>
+          <a:xfrm>
+            <a:off x="520045" y="355698"/>
+            <a:ext cx="10515600" cy="1325563"/>
+          </a:xfrm>
+        </p:spPr>
+        <p:txBody>
+          <a:bodyPr/>
+          <a:lstStyle/>
+          <a:p>
+            <a:r>
+              <a:rPr lang="en-US" b="1" dirty="0" err="1">
+                <a:latin typeface="Aharoni" panose="02010803020104030203" pitchFamily="2" charset="-79"/>
+                <a:cs typeface="Aharoni" panose="02010803020104030203" pitchFamily="2" charset="-79"/>
+              </a:rPr>
+              <a:t>Fonctionnement</a:t>
+            </a:r>
+            <a:r>
+              <a:rPr lang="en-US" b="1" dirty="0">
+                <a:latin typeface="Aharoni" panose="02010803020104030203" pitchFamily="2" charset="-79"/>
+                <a:cs typeface="Aharoni" panose="02010803020104030203" pitchFamily="2" charset="-79"/>
+              </a:rPr>
+              <a:t> et </a:t>
+            </a:r>
+            <a:r>
+              <a:rPr lang="en-US" b="1" dirty="0" err="1">
+                <a:latin typeface="Aharoni" panose="02010803020104030203" pitchFamily="2" charset="-79"/>
+                <a:cs typeface="Aharoni" panose="02010803020104030203" pitchFamily="2" charset="-79"/>
+              </a:rPr>
+              <a:t>Optimisation</a:t>
+            </a:r>
+            <a:endParaRPr lang="fr-FR" b="1" dirty="0">
+              <a:latin typeface="Aharoni" panose="02010803020104030203" pitchFamily="2" charset="-79"/>
+              <a:cs typeface="Aharoni" panose="02010803020104030203" pitchFamily="2" charset="-79"/>
+            </a:endParaRPr>
+          </a:p>
+        </p:txBody>
+      </p:sp>
+      <p:cxnSp>
+        <p:nvCxnSpPr>
+          <p:cNvPr id="4" name="Connecteur droit 3">
+            <a:extLst>
+              <a:ext uri="{FF2B5EF4-FFF2-40B4-BE49-F238E27FC236}">
+                <a16:creationId xmlns:a16="http://schemas.microsoft.com/office/drawing/2014/main" id="{EA0713B6-B49A-5F65-E66B-43D7FB988FA5}"/>
+              </a:ext>
+            </a:extLst>
+          </p:cNvPr>
+          <p:cNvCxnSpPr/>
+          <p:nvPr/>
+        </p:nvCxnSpPr>
+        <p:spPr>
+          <a:xfrm>
+            <a:off x="520045" y="1329180"/>
+            <a:ext cx="11151909" cy="0"/>
+          </a:xfrm>
+          <a:prstGeom prst="line">
+            <a:avLst/>
+          </a:prstGeom>
+          <a:ln w="19050"/>
+        </p:spPr>
+        <p:style>
+          <a:lnRef idx="1">
+            <a:schemeClr val="accent1"/>
+          </a:lnRef>
+          <a:fillRef idx="0">
+            <a:schemeClr val="accent1"/>
+          </a:fillRef>
+          <a:effectRef idx="0">
+            <a:schemeClr val="accent1"/>
+          </a:effectRef>
+          <a:fontRef idx="minor">
+            <a:schemeClr val="tx1"/>
+          </a:fontRef>
+        </p:style>
+      </p:cxnSp>
+      <p:sp>
+        <p:nvSpPr>
+          <p:cNvPr id="5" name="ZoneTexte 4">
+            <a:extLst>
+              <a:ext uri="{FF2B5EF4-FFF2-40B4-BE49-F238E27FC236}">
+                <a16:creationId xmlns:a16="http://schemas.microsoft.com/office/drawing/2014/main" id="{CFA75C57-15BF-7022-F3F8-FD8101BCFD92}"/>
+              </a:ext>
+            </a:extLst>
+          </p:cNvPr>
+          <p:cNvSpPr txBox="1"/>
+          <p:nvPr/>
+        </p:nvSpPr>
+        <p:spPr>
+          <a:xfrm>
+            <a:off x="520044" y="1681261"/>
+            <a:ext cx="8846205" cy="4708981"/>
+          </a:xfrm>
+          <a:prstGeom prst="rect">
+            <a:avLst/>
+          </a:prstGeom>
+          <a:noFill/>
+        </p:spPr>
+        <p:txBody>
+          <a:bodyPr wrap="square" rtlCol="0">
+            <a:spAutoFit/>
+          </a:bodyPr>
+          <a:lstStyle/>
+          <a:p>
+            <a:pPr marL="285750" indent="-285750">
+              <a:spcAft>
+                <a:spcPts val="2400"/>
+              </a:spcAft>
+              <a:buFont typeface="Arial" panose="020B0604020202020204" pitchFamily="34" charset="0"/>
+              <a:buChar char="•"/>
+            </a:pPr>
+            <a:r>
+              <a:rPr lang="fr-FR" sz="2000" dirty="0"/>
+              <a:t>Les 4 phases de MCTS:</a:t>
+            </a:r>
+          </a:p>
+          <a:p>
+            <a:pPr marL="742950" lvl="1" indent="-285750">
+              <a:spcAft>
+                <a:spcPts val="2400"/>
+              </a:spcAft>
+              <a:buFont typeface="Arial" panose="020B0604020202020204" pitchFamily="34" charset="0"/>
+              <a:buChar char="•"/>
+            </a:pPr>
+            <a:r>
+              <a:rPr lang="fr-FR" sz="2000" dirty="0"/>
+              <a:t>Sélection</a:t>
+            </a:r>
+          </a:p>
+          <a:p>
+            <a:pPr marL="742950" lvl="1" indent="-285750">
+              <a:spcAft>
+                <a:spcPts val="2400"/>
+              </a:spcAft>
+              <a:buFont typeface="Arial" panose="020B0604020202020204" pitchFamily="34" charset="0"/>
+              <a:buChar char="•"/>
+            </a:pPr>
+            <a:r>
+              <a:rPr lang="fr-FR" sz="2000" dirty="0"/>
+              <a:t>Expansion</a:t>
+            </a:r>
+          </a:p>
+          <a:p>
+            <a:pPr marL="742950" lvl="1" indent="-285750">
+              <a:spcAft>
+                <a:spcPts val="2400"/>
+              </a:spcAft>
+              <a:buFont typeface="Arial" panose="020B0604020202020204" pitchFamily="34" charset="0"/>
+              <a:buChar char="•"/>
+            </a:pPr>
+            <a:r>
+              <a:rPr lang="fr-FR" sz="2000" dirty="0"/>
+              <a:t>Simulation</a:t>
+            </a:r>
+          </a:p>
+          <a:p>
+            <a:pPr marL="742950" lvl="1" indent="-285750">
+              <a:spcAft>
+                <a:spcPts val="2400"/>
+              </a:spcAft>
+              <a:buFont typeface="Arial" panose="020B0604020202020204" pitchFamily="34" charset="0"/>
+              <a:buChar char="•"/>
+            </a:pPr>
+            <a:r>
+              <a:rPr lang="fr-FR" sz="2000" dirty="0"/>
+              <a:t>Back propagation</a:t>
+            </a:r>
+          </a:p>
+          <a:p>
+            <a:pPr marL="285750" indent="-285750">
+              <a:spcAft>
+                <a:spcPts val="2400"/>
+              </a:spcAft>
+              <a:buFont typeface="Arial" panose="020B0604020202020204" pitchFamily="34" charset="0"/>
+              <a:buChar char="•"/>
+            </a:pPr>
+            <a:r>
+              <a:rPr lang="fr-FR" sz="2000" dirty="0"/>
+              <a:t>Stratégie UCT</a:t>
+            </a:r>
+          </a:p>
+          <a:p>
+            <a:pPr marL="285750" indent="-285750">
+              <a:spcAft>
+                <a:spcPts val="2400"/>
+              </a:spcAft>
+              <a:buFont typeface="Arial" panose="020B0604020202020204" pitchFamily="34" charset="0"/>
+              <a:buChar char="•"/>
+            </a:pPr>
+            <a:r>
+              <a:rPr lang="fr-FR" sz="2000" dirty="0"/>
+              <a:t>Amélioration de l’exploration</a:t>
+            </a:r>
+          </a:p>
+          <a:p>
+            <a:pPr marL="285750" indent="-285750">
+              <a:spcAft>
+                <a:spcPts val="2400"/>
+              </a:spcAft>
+              <a:buFont typeface="Arial" panose="020B0604020202020204" pitchFamily="34" charset="0"/>
+              <a:buChar char="•"/>
+            </a:pPr>
+            <a:endParaRPr lang="fr-FR" sz="2000" dirty="0"/>
+          </a:p>
+        </p:txBody>
+      </p:sp>
+      <mc:AlternateContent xmlns:mc="http://schemas.openxmlformats.org/markup-compatibility/2006">
+        <mc:Choice xmlns:a14="http://schemas.microsoft.com/office/drawing/2010/main" Requires="a14">
+          <p:sp>
+            <p:nvSpPr>
+              <p:cNvPr id="3" name="ZoneTexte 2">
+                <a:extLst>
+                  <a:ext uri="{FF2B5EF4-FFF2-40B4-BE49-F238E27FC236}">
+                    <a16:creationId xmlns:a16="http://schemas.microsoft.com/office/drawing/2014/main" id="{19F3D49F-9E9F-5849-89D8-4E1B9D16FF96}"/>
+                  </a:ext>
+                </a:extLst>
+              </p:cNvPr>
+              <p:cNvSpPr txBox="1"/>
+              <p:nvPr/>
+            </p:nvSpPr>
+            <p:spPr>
+              <a:xfrm>
+                <a:off x="1768789" y="5566751"/>
+                <a:ext cx="9642162" cy="836191"/>
+              </a:xfrm>
+              <a:prstGeom prst="rect">
+                <a:avLst/>
+              </a:prstGeom>
+              <a:noFill/>
+            </p:spPr>
+            <p:txBody>
+              <a:bodyPr wrap="square" lIns="0" tIns="0" rIns="0" bIns="0" rtlCol="0">
+                <a:spAutoFit/>
+              </a:bodyPr>
+              <a:lstStyle/>
+              <a:p>
+                <a14:m>
+                  <m:oMathPara xmlns:m="http://schemas.openxmlformats.org/officeDocument/2006/math">
+                    <m:oMathParaPr>
+                      <m:jc m:val="centerGroup"/>
+                    </m:oMathParaPr>
+                    <m:oMath xmlns:m="http://schemas.openxmlformats.org/officeDocument/2006/math">
+                      <m:r>
+                        <a:rPr lang="fr-FR" sz="2800" b="0" i="1" smtClean="0">
+                          <a:solidFill>
+                            <a:srgbClr val="0070C0"/>
+                          </a:solidFill>
+                          <a:latin typeface="Cambria Math" panose="02040503050406030204" pitchFamily="18" charset="0"/>
+                        </a:rPr>
+                        <m:t>𝑟𝑒𝑤𝑎𝑟𝑑</m:t>
+                      </m:r>
+                      <m:r>
+                        <a:rPr lang="fr-FR" sz="2800" b="0" i="1" smtClean="0">
+                          <a:solidFill>
+                            <a:srgbClr val="0070C0"/>
+                          </a:solidFill>
+                          <a:latin typeface="Cambria Math" panose="02040503050406030204" pitchFamily="18" charset="0"/>
+                        </a:rPr>
+                        <m:t>=</m:t>
+                      </m:r>
+                      <m:r>
+                        <a:rPr lang="fr-FR" sz="2800" b="0" i="1" smtClean="0">
+                          <a:solidFill>
+                            <a:srgbClr val="0070C0"/>
+                          </a:solidFill>
+                          <a:latin typeface="Cambria Math" panose="02040503050406030204" pitchFamily="18" charset="0"/>
+                        </a:rPr>
+                        <m:t>𝑠𝑐𝑜𝑟𝑒</m:t>
+                      </m:r>
+                      <m:r>
+                        <a:rPr lang="fr-FR" sz="2800" b="0" i="1" smtClean="0">
+                          <a:solidFill>
+                            <a:srgbClr val="0070C0"/>
+                          </a:solidFill>
+                          <a:latin typeface="Cambria Math" panose="02040503050406030204" pitchFamily="18" charset="0"/>
+                        </a:rPr>
+                        <m:t>+</m:t>
+                      </m:r>
+                      <m:f>
+                        <m:fPr>
+                          <m:ctrlPr>
+                            <a:rPr lang="fr-FR" sz="2800" b="0" i="1" smtClean="0">
+                              <a:solidFill>
+                                <a:srgbClr val="0070C0"/>
+                              </a:solidFill>
+                              <a:latin typeface="Cambria Math" panose="02040503050406030204" pitchFamily="18" charset="0"/>
+                            </a:rPr>
+                          </m:ctrlPr>
+                        </m:fPr>
+                        <m:num>
+                          <m:d>
+                            <m:dPr>
+                              <m:ctrlPr>
+                                <a:rPr lang="fr-FR" sz="2800" b="0" i="1" smtClean="0">
+                                  <a:solidFill>
+                                    <a:srgbClr val="0070C0"/>
+                                  </a:solidFill>
+                                  <a:latin typeface="Cambria Math" panose="02040503050406030204" pitchFamily="18" charset="0"/>
+                                </a:rPr>
+                              </m:ctrlPr>
+                            </m:dPr>
+                            <m:e>
+                              <m:r>
+                                <a:rPr lang="fr-FR" sz="2800" b="0" i="1" smtClean="0">
+                                  <a:solidFill>
+                                    <a:srgbClr val="0070C0"/>
+                                  </a:solidFill>
+                                  <a:latin typeface="Cambria Math" panose="02040503050406030204" pitchFamily="18" charset="0"/>
+                                </a:rPr>
+                                <m:t>𝑝𝑙𝑎𝑦𝑒𝑟</m:t>
+                              </m:r>
+                              <m:r>
+                                <a:rPr lang="fr-FR" sz="2800" b="0" i="1" smtClean="0">
+                                  <a:solidFill>
+                                    <a:srgbClr val="0070C0"/>
+                                  </a:solidFill>
+                                  <a:latin typeface="Cambria Math" panose="02040503050406030204" pitchFamily="18" charset="0"/>
+                                </a:rPr>
+                                <m:t>_</m:t>
+                              </m:r>
+                              <m:r>
+                                <a:rPr lang="fr-FR" sz="2800" b="0" i="1" smtClean="0">
+                                  <a:solidFill>
+                                    <a:srgbClr val="0070C0"/>
+                                  </a:solidFill>
+                                  <a:latin typeface="Cambria Math" panose="02040503050406030204" pitchFamily="18" charset="0"/>
+                                </a:rPr>
+                                <m:t>𝑝𝑜𝑠</m:t>
+                              </m:r>
+                              <m:r>
+                                <a:rPr lang="fr-FR" sz="2800" b="0" i="1" smtClean="0">
+                                  <a:solidFill>
+                                    <a:srgbClr val="0070C0"/>
+                                  </a:solidFill>
+                                  <a:latin typeface="Cambria Math" panose="02040503050406030204" pitchFamily="18" charset="0"/>
+                                </a:rPr>
+                                <m:t>[0]−</m:t>
+                              </m:r>
+                              <m:r>
+                                <a:rPr lang="fr-FR" sz="2800" b="0" i="1" smtClean="0">
+                                  <a:solidFill>
+                                    <a:srgbClr val="0070C0"/>
+                                  </a:solidFill>
+                                  <a:latin typeface="Cambria Math" panose="02040503050406030204" pitchFamily="18" charset="0"/>
+                                </a:rPr>
+                                <m:t>𝑠𝑡𝑎𝑟</m:t>
+                              </m:r>
+                              <m:r>
+                                <a:rPr lang="fr-FR" sz="2800" b="0" i="1" smtClean="0">
+                                  <a:solidFill>
+                                    <a:srgbClr val="0070C0"/>
+                                  </a:solidFill>
+                                  <a:latin typeface="Cambria Math" panose="02040503050406030204" pitchFamily="18" charset="0"/>
+                                </a:rPr>
+                                <m:t>_</m:t>
+                              </m:r>
+                              <m:r>
+                                <a:rPr lang="fr-FR" sz="2800" b="0" i="1" smtClean="0">
+                                  <a:solidFill>
+                                    <a:srgbClr val="0070C0"/>
+                                  </a:solidFill>
+                                  <a:latin typeface="Cambria Math" panose="02040503050406030204" pitchFamily="18" charset="0"/>
+                                </a:rPr>
+                                <m:t>𝑝𝑜𝑠</m:t>
+                              </m:r>
+                              <m:r>
+                                <a:rPr lang="fr-FR" sz="2800" b="0" i="1" smtClean="0">
+                                  <a:solidFill>
+                                    <a:srgbClr val="0070C0"/>
+                                  </a:solidFill>
+                                  <a:latin typeface="Cambria Math" panose="02040503050406030204" pitchFamily="18" charset="0"/>
+                                </a:rPr>
+                                <m:t>[0]</m:t>
+                              </m:r>
+                            </m:e>
+                          </m:d>
+                        </m:num>
+                        <m:den>
+                          <m:r>
+                            <a:rPr lang="fr-FR" sz="2800" b="0" i="1" smtClean="0">
+                              <a:solidFill>
+                                <a:srgbClr val="0070C0"/>
+                              </a:solidFill>
+                              <a:latin typeface="Cambria Math" panose="02040503050406030204" pitchFamily="18" charset="0"/>
+                            </a:rPr>
+                            <m:t>100</m:t>
+                          </m:r>
+                        </m:den>
+                      </m:f>
+                    </m:oMath>
+                  </m:oMathPara>
+                </a14:m>
+                <a:endParaRPr lang="fr-FR" sz="3200" dirty="0"/>
+              </a:p>
+            </p:txBody>
+          </p:sp>
+        </mc:Choice>
+        <mc:Fallback>
+          <p:sp>
+            <p:nvSpPr>
+              <p:cNvPr id="3" name="ZoneTexte 2">
+                <a:extLst>
+                  <a:ext uri="{FF2B5EF4-FFF2-40B4-BE49-F238E27FC236}">
+                    <a16:creationId xmlns:a16="http://schemas.microsoft.com/office/drawing/2014/main" id="{19F3D49F-9E9F-5849-89D8-4E1B9D16FF96}"/>
+                  </a:ext>
+                </a:extLst>
+              </p:cNvPr>
+              <p:cNvSpPr txBox="1">
+                <a:spLocks noRot="1" noChangeAspect="1" noMove="1" noResize="1" noEditPoints="1" noAdjustHandles="1" noChangeArrowheads="1" noChangeShapeType="1" noTextEdit="1"/>
+              </p:cNvSpPr>
+              <p:nvPr/>
+            </p:nvSpPr>
+            <p:spPr>
+              <a:xfrm>
+                <a:off x="1768789" y="5566751"/>
+                <a:ext cx="9642162" cy="836191"/>
+              </a:xfrm>
+              <a:prstGeom prst="rect">
+                <a:avLst/>
+              </a:prstGeom>
+              <a:blipFill>
+                <a:blip r:embed="rId2"/>
+                <a:stretch>
+                  <a:fillRect/>
+                </a:stretch>
+              </a:blipFill>
+            </p:spPr>
+            <p:txBody>
+              <a:bodyPr/>
+              <a:lstStyle/>
+              <a:p>
+                <a:r>
+                  <a:rPr lang="fr-FR">
+                    <a:noFill/>
+                  </a:rPr>
+                  <a:t> </a:t>
+                </a:r>
+              </a:p>
+            </p:txBody>
+          </p:sp>
+        </mc:Fallback>
+      </mc:AlternateContent>
+    </p:spTree>
+    <p:extLst>
+      <p:ext uri="{BB962C8B-B14F-4D97-AF65-F5344CB8AC3E}">
+        <p14:creationId xmlns:p14="http://schemas.microsoft.com/office/powerpoint/2010/main" val="2312240916"/>
+      </p:ext>
+    </p:extLst>
+  </p:cSld>
+  <p:clrMapOvr>
+    <a:masterClrMapping/>
+  </p:clrMapOvr>
+</p:sld>
+</file>
+
+<file path=ppt/slides/slide18.xml><?xml version="1.0" encoding="utf-8"?>
+<p:sld xmlns:a="http://schemas.openxmlformats.org/drawingml/2006/main" xmlns:r="http://schemas.openxmlformats.org/officeDocument/2006/relationships" xmlns:p="http://schemas.openxmlformats.org/presentationml/2006/main">
+  <p:cSld>
+    <p:spTree>
+      <p:nvGrpSpPr>
+        <p:cNvPr id="1" name="">
+          <a:extLst>
+            <a:ext uri="{FF2B5EF4-FFF2-40B4-BE49-F238E27FC236}">
+              <a16:creationId xmlns:a16="http://schemas.microsoft.com/office/drawing/2014/main" id="{656E5FEC-7F3E-CA26-82C3-4CD77D74EEAC}"/>
+            </a:ext>
+          </a:extLst>
+        </p:cNvPr>
+        <p:cNvGrpSpPr/>
+        <p:nvPr/>
+      </p:nvGrpSpPr>
+      <p:grpSpPr>
+        <a:xfrm>
+          <a:off x="0" y="0"/>
+          <a:ext cx="0" cy="0"/>
+          <a:chOff x="0" y="0"/>
+          <a:chExt cx="0" cy="0"/>
+        </a:xfrm>
+      </p:grpSpPr>
+      <p:sp>
+        <p:nvSpPr>
+          <p:cNvPr id="2" name="Titre 1">
+            <a:extLst>
+              <a:ext uri="{FF2B5EF4-FFF2-40B4-BE49-F238E27FC236}">
+                <a16:creationId xmlns:a16="http://schemas.microsoft.com/office/drawing/2014/main" id="{0E3DA1B4-4869-E9D3-B0DA-6825BE6909AA}"/>
+              </a:ext>
+            </a:extLst>
+          </p:cNvPr>
+          <p:cNvSpPr>
+            <a:spLocks noGrp="1"/>
+          </p:cNvSpPr>
+          <p:nvPr>
+            <p:ph type="title"/>
+          </p:nvPr>
+        </p:nvSpPr>
+        <p:spPr>
+          <a:xfrm>
+            <a:off x="4038271" y="0"/>
+            <a:ext cx="3861455" cy="1325563"/>
+          </a:xfrm>
+        </p:spPr>
+        <p:txBody>
+          <a:bodyPr/>
+          <a:lstStyle/>
+          <a:p>
+            <a:r>
+              <a:rPr lang="en-US" b="1" dirty="0">
+                <a:latin typeface="Aharoni" panose="02010803020104030203" pitchFamily="2" charset="-79"/>
+                <a:cs typeface="Aharoni" panose="02010803020104030203" pitchFamily="2" charset="-79"/>
+              </a:rPr>
+              <a:t>CONCLUSION</a:t>
+            </a:r>
+            <a:endParaRPr lang="fr-FR" b="1" dirty="0">
+              <a:latin typeface="Aharoni" panose="02010803020104030203" pitchFamily="2" charset="-79"/>
+              <a:cs typeface="Aharoni" panose="02010803020104030203" pitchFamily="2" charset="-79"/>
+            </a:endParaRPr>
+          </a:p>
+        </p:txBody>
+      </p:sp>
+      <p:cxnSp>
+        <p:nvCxnSpPr>
+          <p:cNvPr id="4" name="Connecteur droit 3">
+            <a:extLst>
+              <a:ext uri="{FF2B5EF4-FFF2-40B4-BE49-F238E27FC236}">
+                <a16:creationId xmlns:a16="http://schemas.microsoft.com/office/drawing/2014/main" id="{1A79D541-8BE6-D78A-8F46-E45B6215BC02}"/>
+              </a:ext>
+            </a:extLst>
+          </p:cNvPr>
+          <p:cNvCxnSpPr/>
+          <p:nvPr/>
+        </p:nvCxnSpPr>
+        <p:spPr>
+          <a:xfrm>
+            <a:off x="520045" y="1037080"/>
+            <a:ext cx="11151909" cy="0"/>
+          </a:xfrm>
+          <a:prstGeom prst="line">
+            <a:avLst/>
+          </a:prstGeom>
+          <a:ln w="19050"/>
+        </p:spPr>
+        <p:style>
+          <a:lnRef idx="1">
+            <a:schemeClr val="accent1"/>
+          </a:lnRef>
+          <a:fillRef idx="0">
+            <a:schemeClr val="accent1"/>
+          </a:fillRef>
+          <a:effectRef idx="0">
+            <a:schemeClr val="accent1"/>
+          </a:effectRef>
+          <a:fontRef idx="minor">
+            <a:schemeClr val="tx1"/>
+          </a:fontRef>
+        </p:style>
+      </p:cxnSp>
+      <p:pic>
+        <p:nvPicPr>
+          <p:cNvPr id="8" name="Image 7" descr="Une image contenant capture d’écran, texte, carré, ligne&#10;&#10;Description générée automatiquement">
+            <a:extLst>
+              <a:ext uri="{FF2B5EF4-FFF2-40B4-BE49-F238E27FC236}">
+                <a16:creationId xmlns:a16="http://schemas.microsoft.com/office/drawing/2014/main" id="{55AD5206-8087-0DED-2E85-DDD61205BEE4}"/>
+              </a:ext>
+            </a:extLst>
+          </p:cNvPr>
+          <p:cNvPicPr>
+            <a:picLocks noChangeAspect="1"/>
+          </p:cNvPicPr>
+          <p:nvPr/>
+        </p:nvPicPr>
+        <p:blipFill>
+          <a:blip r:embed="rId2">
+            <a:extLst>
+              <a:ext uri="{28A0092B-C50C-407E-A947-70E740481C1C}">
+                <a14:useLocalDpi xmlns:a14="http://schemas.microsoft.com/office/drawing/2010/main" val="0"/>
+              </a:ext>
+            </a:extLst>
+          </a:blip>
+          <a:stretch>
+            <a:fillRect/>
+          </a:stretch>
+        </p:blipFill>
+        <p:spPr>
+          <a:xfrm>
+            <a:off x="2390775" y="1720471"/>
+            <a:ext cx="7410450" cy="4100449"/>
+          </a:xfrm>
+          <a:prstGeom prst="rect">
+            <a:avLst/>
+          </a:prstGeom>
+        </p:spPr>
+      </p:pic>
+    </p:spTree>
+    <p:extLst>
+      <p:ext uri="{BB962C8B-B14F-4D97-AF65-F5344CB8AC3E}">
+        <p14:creationId xmlns:p14="http://schemas.microsoft.com/office/powerpoint/2010/main" val="1077787258"/>
       </p:ext>
     </p:extLst>
   </p:cSld>

</xml_diff>

<commit_message>
:memo: Update MCTS slides
</commit_message>
<xml_diff>
--- a/report/Renforcement Learning sur Super Mario Bros.pptx
+++ b/report/Renforcement Learning sur Super Mario Bros.pptx
@@ -21,8 +21,9 @@
     <p:sldId id="269" r:id="rId15"/>
     <p:sldId id="270" r:id="rId16"/>
     <p:sldId id="272" r:id="rId17"/>
-    <p:sldId id="273" r:id="rId18"/>
-    <p:sldId id="271" r:id="rId19"/>
+    <p:sldId id="274" r:id="rId18"/>
+    <p:sldId id="275" r:id="rId19"/>
+    <p:sldId id="271" r:id="rId20"/>
   </p:sldIdLst>
   <p:sldSz cx="12192000" cy="6858000"/>
   <p:notesSz cx="6858000" cy="9144000"/>
@@ -4011,7 +4012,7 @@
           <a:p>
             <a:fld id="{5445F93E-4F2C-4DBB-8195-1C53AEDFA418}" type="datetimeFigureOut">
               <a:rPr lang="fr-FR" smtClean="0"/>
-              <a:t>31/10/2024</a:t>
+              <a:t>04/11/2024</a:t>
             </a:fld>
             <a:endParaRPr lang="fr-FR"/>
           </a:p>
@@ -4209,7 +4210,7 @@
           <a:p>
             <a:fld id="{5445F93E-4F2C-4DBB-8195-1C53AEDFA418}" type="datetimeFigureOut">
               <a:rPr lang="fr-FR" smtClean="0"/>
-              <a:t>31/10/2024</a:t>
+              <a:t>04/11/2024</a:t>
             </a:fld>
             <a:endParaRPr lang="fr-FR"/>
           </a:p>
@@ -4417,7 +4418,7 @@
           <a:p>
             <a:fld id="{5445F93E-4F2C-4DBB-8195-1C53AEDFA418}" type="datetimeFigureOut">
               <a:rPr lang="fr-FR" smtClean="0"/>
-              <a:t>31/10/2024</a:t>
+              <a:t>04/11/2024</a:t>
             </a:fld>
             <a:endParaRPr lang="fr-FR"/>
           </a:p>
@@ -4615,7 +4616,7 @@
           <a:p>
             <a:fld id="{5445F93E-4F2C-4DBB-8195-1C53AEDFA418}" type="datetimeFigureOut">
               <a:rPr lang="fr-FR" smtClean="0"/>
-              <a:t>31/10/2024</a:t>
+              <a:t>04/11/2024</a:t>
             </a:fld>
             <a:endParaRPr lang="fr-FR"/>
           </a:p>
@@ -4890,7 +4891,7 @@
           <a:p>
             <a:fld id="{5445F93E-4F2C-4DBB-8195-1C53AEDFA418}" type="datetimeFigureOut">
               <a:rPr lang="fr-FR" smtClean="0"/>
-              <a:t>31/10/2024</a:t>
+              <a:t>04/11/2024</a:t>
             </a:fld>
             <a:endParaRPr lang="fr-FR"/>
           </a:p>
@@ -5155,7 +5156,7 @@
           <a:p>
             <a:fld id="{5445F93E-4F2C-4DBB-8195-1C53AEDFA418}" type="datetimeFigureOut">
               <a:rPr lang="fr-FR" smtClean="0"/>
-              <a:t>31/10/2024</a:t>
+              <a:t>04/11/2024</a:t>
             </a:fld>
             <a:endParaRPr lang="fr-FR"/>
           </a:p>
@@ -5567,7 +5568,7 @@
           <a:p>
             <a:fld id="{5445F93E-4F2C-4DBB-8195-1C53AEDFA418}" type="datetimeFigureOut">
               <a:rPr lang="fr-FR" smtClean="0"/>
-              <a:t>31/10/2024</a:t>
+              <a:t>04/11/2024</a:t>
             </a:fld>
             <a:endParaRPr lang="fr-FR"/>
           </a:p>
@@ -5708,7 +5709,7 @@
           <a:p>
             <a:fld id="{5445F93E-4F2C-4DBB-8195-1C53AEDFA418}" type="datetimeFigureOut">
               <a:rPr lang="fr-FR" smtClean="0"/>
-              <a:t>31/10/2024</a:t>
+              <a:t>04/11/2024</a:t>
             </a:fld>
             <a:endParaRPr lang="fr-FR"/>
           </a:p>
@@ -5821,7 +5822,7 @@
           <a:p>
             <a:fld id="{5445F93E-4F2C-4DBB-8195-1C53AEDFA418}" type="datetimeFigureOut">
               <a:rPr lang="fr-FR" smtClean="0"/>
-              <a:t>31/10/2024</a:t>
+              <a:t>04/11/2024</a:t>
             </a:fld>
             <a:endParaRPr lang="fr-FR"/>
           </a:p>
@@ -6132,7 +6133,7 @@
           <a:p>
             <a:fld id="{5445F93E-4F2C-4DBB-8195-1C53AEDFA418}" type="datetimeFigureOut">
               <a:rPr lang="fr-FR" smtClean="0"/>
-              <a:t>31/10/2024</a:t>
+              <a:t>04/11/2024</a:t>
             </a:fld>
             <a:endParaRPr lang="fr-FR"/>
           </a:p>
@@ -6420,7 +6421,7 @@
           <a:p>
             <a:fld id="{5445F93E-4F2C-4DBB-8195-1C53AEDFA418}" type="datetimeFigureOut">
               <a:rPr lang="fr-FR" smtClean="0"/>
-              <a:t>31/10/2024</a:t>
+              <a:t>04/11/2024</a:t>
             </a:fld>
             <a:endParaRPr lang="fr-FR"/>
           </a:p>
@@ -6661,7 +6662,7 @@
           <a:p>
             <a:fld id="{5445F93E-4F2C-4DBB-8195-1C53AEDFA418}" type="datetimeFigureOut">
               <a:rPr lang="fr-FR" smtClean="0"/>
-              <a:t>31/10/2024</a:t>
+              <a:t>04/11/2024</a:t>
             </a:fld>
             <a:endParaRPr lang="fr-FR"/>
           </a:p>
@@ -9394,8 +9395,8 @@
           </p:sp>
         </mc:Fallback>
       </mc:AlternateContent>
-      <mc:AlternateContent xmlns:mc="http://schemas.openxmlformats.org/markup-compatibility/2006" xmlns:a14="http://schemas.microsoft.com/office/drawing/2010/main">
-        <mc:Choice Requires="a14">
+      <mc:AlternateContent xmlns:mc="http://schemas.openxmlformats.org/markup-compatibility/2006">
+        <mc:Choice xmlns:a14="http://schemas.microsoft.com/office/drawing/2010/main" Requires="a14">
           <p:sp>
             <p:nvSpPr>
               <p:cNvPr id="8" name="ZoneTexte 7">
@@ -9766,7 +9767,7 @@
             </p:txBody>
           </p:sp>
         </mc:Choice>
-        <mc:Fallback xmlns="">
+        <mc:Fallback>
           <p:sp>
             <p:nvSpPr>
               <p:cNvPr id="8" name="ZoneTexte 7">
@@ -10238,6 +10239,36 @@
           </a:p>
         </p:txBody>
       </p:sp>
+      <p:pic>
+        <p:nvPicPr>
+          <p:cNvPr id="6" name="Image 5">
+            <a:extLst>
+              <a:ext uri="{FF2B5EF4-FFF2-40B4-BE49-F238E27FC236}">
+                <a16:creationId xmlns:a16="http://schemas.microsoft.com/office/drawing/2014/main" id="{F76E6AC7-9FFE-709D-41E3-75E9BB79AA67}"/>
+              </a:ext>
+            </a:extLst>
+          </p:cNvPr>
+          <p:cNvPicPr>
+            <a:picLocks noChangeAspect="1"/>
+          </p:cNvPicPr>
+          <p:nvPr/>
+        </p:nvPicPr>
+        <p:blipFill>
+          <a:blip r:embed="rId2"/>
+          <a:stretch>
+            <a:fillRect/>
+          </a:stretch>
+        </p:blipFill>
+        <p:spPr>
+          <a:xfrm>
+            <a:off x="3839751" y="2616076"/>
+            <a:ext cx="5896798" cy="3724795"/>
+          </a:xfrm>
+          <a:prstGeom prst="rect">
+            <a:avLst/>
+          </a:prstGeom>
+        </p:spPr>
+      </p:pic>
     </p:spTree>
     <p:extLst>
       <p:ext uri="{BB962C8B-B14F-4D97-AF65-F5344CB8AC3E}">
@@ -10259,7 +10290,7 @@
         <p:cNvPr id="1" name="">
           <a:extLst>
             <a:ext uri="{FF2B5EF4-FFF2-40B4-BE49-F238E27FC236}">
-              <a16:creationId xmlns:a16="http://schemas.microsoft.com/office/drawing/2014/main" id="{CD281F2F-7836-61D3-E759-888FD10355D2}"/>
+              <a16:creationId xmlns:a16="http://schemas.microsoft.com/office/drawing/2014/main" id="{A8144A38-20FC-2EE3-F43D-DF2229ACF358}"/>
             </a:ext>
           </a:extLst>
         </p:cNvPr>
@@ -10279,7 +10310,7 @@
           <p:cNvPr id="2" name="Titre 1">
             <a:extLst>
               <a:ext uri="{FF2B5EF4-FFF2-40B4-BE49-F238E27FC236}">
-                <a16:creationId xmlns:a16="http://schemas.microsoft.com/office/drawing/2014/main" id="{7FAD02F8-D306-5683-C2F2-998B7ED78D9E}"/>
+                <a16:creationId xmlns:a16="http://schemas.microsoft.com/office/drawing/2014/main" id="{9FA952E0-2581-A8C6-7B1D-EEBB283E3021}"/>
               </a:ext>
             </a:extLst>
           </p:cNvPr>
@@ -10301,19 +10332,1003 @@
           <a:lstStyle/>
           <a:p>
             <a:r>
-              <a:rPr lang="en-US" b="1" dirty="0" err="1">
-                <a:latin typeface="Aharoni" panose="02010803020104030203" pitchFamily="2" charset="-79"/>
-                <a:cs typeface="Aharoni" panose="02010803020104030203" pitchFamily="2" charset="-79"/>
-              </a:rPr>
-              <a:t>Fonctionnement</a:t>
-            </a:r>
-            <a:r>
               <a:rPr lang="en-US" b="1" dirty="0">
                 <a:latin typeface="Aharoni" panose="02010803020104030203" pitchFamily="2" charset="-79"/>
                 <a:cs typeface="Aharoni" panose="02010803020104030203" pitchFamily="2" charset="-79"/>
               </a:rPr>
-              <a:t> et </a:t>
-            </a:r>
+              <a:t>Upper Confidence bounds for Trees</a:t>
+            </a:r>
+            <a:endParaRPr lang="fr-FR" b="1" dirty="0">
+              <a:latin typeface="Aharoni" panose="02010803020104030203" pitchFamily="2" charset="-79"/>
+              <a:cs typeface="Aharoni" panose="02010803020104030203" pitchFamily="2" charset="-79"/>
+            </a:endParaRPr>
+          </a:p>
+        </p:txBody>
+      </p:sp>
+      <p:cxnSp>
+        <p:nvCxnSpPr>
+          <p:cNvPr id="4" name="Connecteur droit 3">
+            <a:extLst>
+              <a:ext uri="{FF2B5EF4-FFF2-40B4-BE49-F238E27FC236}">
+                <a16:creationId xmlns:a16="http://schemas.microsoft.com/office/drawing/2014/main" id="{040D945B-7D09-8908-D0E1-65A325FE8B3A}"/>
+              </a:ext>
+            </a:extLst>
+          </p:cNvPr>
+          <p:cNvCxnSpPr/>
+          <p:nvPr/>
+        </p:nvCxnSpPr>
+        <p:spPr>
+          <a:xfrm>
+            <a:off x="520045" y="1329180"/>
+            <a:ext cx="11151909" cy="0"/>
+          </a:xfrm>
+          <a:prstGeom prst="line">
+            <a:avLst/>
+          </a:prstGeom>
+          <a:ln w="19050"/>
+        </p:spPr>
+        <p:style>
+          <a:lnRef idx="1">
+            <a:schemeClr val="accent1"/>
+          </a:lnRef>
+          <a:fillRef idx="0">
+            <a:schemeClr val="accent1"/>
+          </a:fillRef>
+          <a:effectRef idx="0">
+            <a:schemeClr val="accent1"/>
+          </a:effectRef>
+          <a:fontRef idx="minor">
+            <a:schemeClr val="tx1"/>
+          </a:fontRef>
+        </p:style>
+      </p:cxnSp>
+      <mc:AlternateContent xmlns:mc="http://schemas.openxmlformats.org/markup-compatibility/2006">
+        <mc:Choice xmlns:a14="http://schemas.microsoft.com/office/drawing/2010/main" Requires="a14">
+          <p:sp>
+            <p:nvSpPr>
+              <p:cNvPr id="6" name="ZoneTexte 5">
+                <a:extLst>
+                  <a:ext uri="{FF2B5EF4-FFF2-40B4-BE49-F238E27FC236}">
+                    <a16:creationId xmlns:a16="http://schemas.microsoft.com/office/drawing/2014/main" id="{70DBDBEC-9C7B-1292-93D5-8140D11EBDF8}"/>
+                  </a:ext>
+                </a:extLst>
+              </p:cNvPr>
+              <p:cNvSpPr txBox="1"/>
+              <p:nvPr/>
+            </p:nvSpPr>
+            <p:spPr>
+              <a:xfrm>
+                <a:off x="3196686" y="2033494"/>
+                <a:ext cx="4638362" cy="1002134"/>
+              </a:xfrm>
+              <a:prstGeom prst="rect">
+                <a:avLst/>
+              </a:prstGeom>
+              <a:noFill/>
+            </p:spPr>
+            <p:txBody>
+              <a:bodyPr wrap="square" lIns="0" tIns="0" rIns="0" bIns="0" rtlCol="0">
+                <a:spAutoFit/>
+              </a:bodyPr>
+              <a:lstStyle/>
+              <a:p>
+                <a:r>
+                  <a:rPr lang="en-US" sz="3200" b="0" dirty="0">
+                    <a:solidFill>
+                      <a:srgbClr val="0070C0"/>
+                    </a:solidFill>
+                  </a:rPr>
+                  <a:t>UTC(</a:t>
+                </a:r>
+                <a14:m>
+                  <m:oMath xmlns:m="http://schemas.openxmlformats.org/officeDocument/2006/math">
+                    <m:sSub>
+                      <m:sSubPr>
+                        <m:ctrlPr>
+                          <a:rPr lang="en-US" sz="3200" i="1" dirty="0" smtClean="0">
+                            <a:solidFill>
+                              <a:srgbClr val="0070C0"/>
+                            </a:solidFill>
+                            <a:latin typeface="Cambria Math" panose="02040503050406030204" pitchFamily="18" charset="0"/>
+                          </a:rPr>
+                        </m:ctrlPr>
+                      </m:sSubPr>
+                      <m:e>
+                        <m:r>
+                          <a:rPr lang="fr-FR" sz="3200" b="0" i="1" dirty="0" smtClean="0">
+                            <a:solidFill>
+                              <a:srgbClr val="0070C0"/>
+                            </a:solidFill>
+                            <a:latin typeface="Cambria Math" panose="02040503050406030204" pitchFamily="18" charset="0"/>
+                          </a:rPr>
+                          <m:t>𝑠</m:t>
+                        </m:r>
+                      </m:e>
+                      <m:sub>
+                        <m:r>
+                          <a:rPr lang="fr-FR" sz="3200" b="0" i="1" dirty="0" smtClean="0">
+                            <a:solidFill>
+                              <a:srgbClr val="0070C0"/>
+                            </a:solidFill>
+                            <a:latin typeface="Cambria Math" panose="02040503050406030204" pitchFamily="18" charset="0"/>
+                          </a:rPr>
+                          <m:t>𝑖</m:t>
+                        </m:r>
+                      </m:sub>
+                    </m:sSub>
+                  </m:oMath>
+                </a14:m>
+                <a:r>
+                  <a:rPr lang="en-US" sz="3200" b="0" dirty="0">
+                    <a:solidFill>
+                      <a:srgbClr val="0070C0"/>
+                    </a:solidFill>
+                  </a:rPr>
+                  <a:t>) </a:t>
+                </a:r>
+                <a14:m>
+                  <m:oMath xmlns:m="http://schemas.openxmlformats.org/officeDocument/2006/math">
+                    <m:r>
+                      <a:rPr lang="en-US" sz="3200" b="0" i="1" smtClean="0">
+                        <a:latin typeface="Cambria Math" panose="02040503050406030204" pitchFamily="18" charset="0"/>
+                      </a:rPr>
+                      <m:t>=</m:t>
+                    </m:r>
+                    <m:f>
+                      <m:fPr>
+                        <m:ctrlPr>
+                          <a:rPr lang="en-US" sz="3200" b="0" i="1" smtClean="0">
+                            <a:solidFill>
+                              <a:srgbClr val="00B050"/>
+                            </a:solidFill>
+                            <a:latin typeface="Cambria Math" panose="02040503050406030204" pitchFamily="18" charset="0"/>
+                          </a:rPr>
+                        </m:ctrlPr>
+                      </m:fPr>
+                      <m:num>
+                        <m:sSub>
+                          <m:sSubPr>
+                            <m:ctrlPr>
+                              <a:rPr lang="en-US" sz="3200" b="0" i="1" smtClean="0">
+                                <a:solidFill>
+                                  <a:srgbClr val="00B050"/>
+                                </a:solidFill>
+                                <a:latin typeface="Cambria Math" panose="02040503050406030204" pitchFamily="18" charset="0"/>
+                              </a:rPr>
+                            </m:ctrlPr>
+                          </m:sSubPr>
+                          <m:e>
+                            <m:r>
+                              <a:rPr lang="fr-FR" sz="3200" b="0" i="1" smtClean="0">
+                                <a:solidFill>
+                                  <a:srgbClr val="00B050"/>
+                                </a:solidFill>
+                                <a:latin typeface="Cambria Math" panose="02040503050406030204" pitchFamily="18" charset="0"/>
+                              </a:rPr>
+                              <m:t>𝑤</m:t>
+                            </m:r>
+                          </m:e>
+                          <m:sub>
+                            <m:r>
+                              <a:rPr lang="fr-FR" sz="3200" b="0" i="1" smtClean="0">
+                                <a:solidFill>
+                                  <a:srgbClr val="00B050"/>
+                                </a:solidFill>
+                                <a:latin typeface="Cambria Math" panose="02040503050406030204" pitchFamily="18" charset="0"/>
+                              </a:rPr>
+                              <m:t>𝑖</m:t>
+                            </m:r>
+                          </m:sub>
+                        </m:sSub>
+                      </m:num>
+                      <m:den>
+                        <m:sSub>
+                          <m:sSubPr>
+                            <m:ctrlPr>
+                              <a:rPr lang="en-US" sz="3200" b="0" i="1" smtClean="0">
+                                <a:solidFill>
+                                  <a:srgbClr val="00B050"/>
+                                </a:solidFill>
+                                <a:latin typeface="Cambria Math" panose="02040503050406030204" pitchFamily="18" charset="0"/>
+                              </a:rPr>
+                            </m:ctrlPr>
+                          </m:sSubPr>
+                          <m:e>
+                            <m:r>
+                              <a:rPr lang="fr-FR" sz="3200" b="0" i="1" smtClean="0">
+                                <a:solidFill>
+                                  <a:srgbClr val="00B050"/>
+                                </a:solidFill>
+                                <a:latin typeface="Cambria Math" panose="02040503050406030204" pitchFamily="18" charset="0"/>
+                              </a:rPr>
+                              <m:t>𝑛</m:t>
+                            </m:r>
+                          </m:e>
+                          <m:sub>
+                            <m:r>
+                              <a:rPr lang="fr-FR" sz="3200" b="0" i="1" smtClean="0">
+                                <a:solidFill>
+                                  <a:srgbClr val="00B050"/>
+                                </a:solidFill>
+                                <a:latin typeface="Cambria Math" panose="02040503050406030204" pitchFamily="18" charset="0"/>
+                              </a:rPr>
+                              <m:t>𝑖</m:t>
+                            </m:r>
+                          </m:sub>
+                        </m:sSub>
+                      </m:den>
+                    </m:f>
+                    <m:r>
+                      <a:rPr lang="en-US" sz="3200" b="0" i="1" smtClean="0">
+                        <a:latin typeface="Cambria Math" panose="02040503050406030204" pitchFamily="18" charset="0"/>
+                      </a:rPr>
+                      <m:t>+</m:t>
+                    </m:r>
+                    <m:r>
+                      <a:rPr lang="fr-FR" sz="3200" b="0" i="1" smtClean="0">
+                        <a:solidFill>
+                          <a:srgbClr val="FFC000"/>
+                        </a:solidFill>
+                        <a:latin typeface="Cambria Math" panose="02040503050406030204" pitchFamily="18" charset="0"/>
+                      </a:rPr>
+                      <m:t>𝐶</m:t>
+                    </m:r>
+                    <m:r>
+                      <a:rPr lang="fr-FR" sz="3200" b="0" i="1" smtClean="0">
+                        <a:solidFill>
+                          <a:srgbClr val="FFC000"/>
+                        </a:solidFill>
+                        <a:latin typeface="Cambria Math" panose="02040503050406030204" pitchFamily="18" charset="0"/>
+                      </a:rPr>
+                      <m:t> × </m:t>
+                    </m:r>
+                    <m:rad>
+                      <m:radPr>
+                        <m:degHide m:val="on"/>
+                        <m:ctrlPr>
+                          <a:rPr lang="fr-FR" sz="3200" b="0" i="1" smtClean="0">
+                            <a:solidFill>
+                              <a:srgbClr val="FFC000"/>
+                            </a:solidFill>
+                            <a:latin typeface="Cambria Math" panose="02040503050406030204" pitchFamily="18" charset="0"/>
+                            <a:ea typeface="Cambria Math" panose="02040503050406030204" pitchFamily="18" charset="0"/>
+                          </a:rPr>
+                        </m:ctrlPr>
+                      </m:radPr>
+                      <m:deg/>
+                      <m:e>
+                        <m:f>
+                          <m:fPr>
+                            <m:ctrlPr>
+                              <a:rPr lang="fr-FR" sz="3200" b="0" i="1" smtClean="0">
+                                <a:solidFill>
+                                  <a:srgbClr val="FFC000"/>
+                                </a:solidFill>
+                                <a:latin typeface="Cambria Math" panose="02040503050406030204" pitchFamily="18" charset="0"/>
+                                <a:ea typeface="Cambria Math" panose="02040503050406030204" pitchFamily="18" charset="0"/>
+                              </a:rPr>
+                            </m:ctrlPr>
+                          </m:fPr>
+                          <m:num>
+                            <m:r>
+                              <m:rPr>
+                                <m:sty m:val="p"/>
+                              </m:rPr>
+                              <a:rPr lang="fr-FR" sz="3200" b="0" i="0" smtClean="0">
+                                <a:solidFill>
+                                  <a:srgbClr val="FFC000"/>
+                                </a:solidFill>
+                                <a:latin typeface="Cambria Math" panose="02040503050406030204" pitchFamily="18" charset="0"/>
+                                <a:ea typeface="Cambria Math" panose="02040503050406030204" pitchFamily="18" charset="0"/>
+                              </a:rPr>
+                              <m:t>ln</m:t>
+                            </m:r>
+                            <m:r>
+                              <a:rPr lang="fr-FR" sz="3200" b="0" i="1" smtClean="0">
+                                <a:solidFill>
+                                  <a:srgbClr val="FFC000"/>
+                                </a:solidFill>
+                                <a:latin typeface="Cambria Math" panose="02040503050406030204" pitchFamily="18" charset="0"/>
+                                <a:ea typeface="Cambria Math" panose="02040503050406030204" pitchFamily="18" charset="0"/>
+                              </a:rPr>
+                              <m:t>⁡(</m:t>
+                            </m:r>
+                            <m:r>
+                              <a:rPr lang="fr-FR" sz="3200" b="0" i="1" smtClean="0">
+                                <a:solidFill>
+                                  <a:srgbClr val="FFC000"/>
+                                </a:solidFill>
+                                <a:latin typeface="Cambria Math" panose="02040503050406030204" pitchFamily="18" charset="0"/>
+                                <a:ea typeface="Cambria Math" panose="02040503050406030204" pitchFamily="18" charset="0"/>
+                              </a:rPr>
+                              <m:t>𝑁</m:t>
+                            </m:r>
+                            <m:r>
+                              <a:rPr lang="fr-FR" sz="3200" b="0" i="1" smtClean="0">
+                                <a:solidFill>
+                                  <a:srgbClr val="FFC000"/>
+                                </a:solidFill>
+                                <a:latin typeface="Cambria Math" panose="02040503050406030204" pitchFamily="18" charset="0"/>
+                                <a:ea typeface="Cambria Math" panose="02040503050406030204" pitchFamily="18" charset="0"/>
+                              </a:rPr>
+                              <m:t>)</m:t>
+                            </m:r>
+                          </m:num>
+                          <m:den>
+                            <m:sSub>
+                              <m:sSubPr>
+                                <m:ctrlPr>
+                                  <a:rPr lang="fr-FR" sz="3200" b="0" i="1" smtClean="0">
+                                    <a:solidFill>
+                                      <a:srgbClr val="FFC000"/>
+                                    </a:solidFill>
+                                    <a:latin typeface="Cambria Math" panose="02040503050406030204" pitchFamily="18" charset="0"/>
+                                    <a:ea typeface="Cambria Math" panose="02040503050406030204" pitchFamily="18" charset="0"/>
+                                  </a:rPr>
+                                </m:ctrlPr>
+                              </m:sSubPr>
+                              <m:e>
+                                <m:r>
+                                  <a:rPr lang="fr-FR" sz="3200" b="0" i="1" smtClean="0">
+                                    <a:solidFill>
+                                      <a:srgbClr val="FFC000"/>
+                                    </a:solidFill>
+                                    <a:latin typeface="Cambria Math" panose="02040503050406030204" pitchFamily="18" charset="0"/>
+                                    <a:ea typeface="Cambria Math" panose="02040503050406030204" pitchFamily="18" charset="0"/>
+                                  </a:rPr>
+                                  <m:t>𝑛</m:t>
+                                </m:r>
+                              </m:e>
+                              <m:sub>
+                                <m:r>
+                                  <a:rPr lang="fr-FR" sz="3200" b="0" i="1" smtClean="0">
+                                    <a:solidFill>
+                                      <a:srgbClr val="FFC000"/>
+                                    </a:solidFill>
+                                    <a:latin typeface="Cambria Math" panose="02040503050406030204" pitchFamily="18" charset="0"/>
+                                    <a:ea typeface="Cambria Math" panose="02040503050406030204" pitchFamily="18" charset="0"/>
+                                  </a:rPr>
+                                  <m:t>𝑖</m:t>
+                                </m:r>
+                              </m:sub>
+                            </m:sSub>
+                          </m:den>
+                        </m:f>
+                      </m:e>
+                    </m:rad>
+                  </m:oMath>
+                </a14:m>
+                <a:endParaRPr lang="fr-FR" sz="3200" dirty="0"/>
+              </a:p>
+            </p:txBody>
+          </p:sp>
+        </mc:Choice>
+        <mc:Fallback>
+          <p:sp>
+            <p:nvSpPr>
+              <p:cNvPr id="6" name="ZoneTexte 5">
+                <a:extLst>
+                  <a:ext uri="{FF2B5EF4-FFF2-40B4-BE49-F238E27FC236}">
+                    <a16:creationId xmlns:a16="http://schemas.microsoft.com/office/drawing/2014/main" id="{70DBDBEC-9C7B-1292-93D5-8140D11EBDF8}"/>
+                  </a:ext>
+                </a:extLst>
+              </p:cNvPr>
+              <p:cNvSpPr txBox="1">
+                <a:spLocks noRot="1" noChangeAspect="1" noMove="1" noResize="1" noEditPoints="1" noAdjustHandles="1" noChangeArrowheads="1" noChangeShapeType="1" noTextEdit="1"/>
+              </p:cNvSpPr>
+              <p:nvPr/>
+            </p:nvSpPr>
+            <p:spPr>
+              <a:xfrm>
+                <a:off x="3196686" y="2033494"/>
+                <a:ext cx="4638362" cy="1002134"/>
+              </a:xfrm>
+              <a:prstGeom prst="rect">
+                <a:avLst/>
+              </a:prstGeom>
+              <a:blipFill>
+                <a:blip r:embed="rId2"/>
+                <a:stretch>
+                  <a:fillRect l="-5256" b="-610"/>
+                </a:stretch>
+              </a:blipFill>
+            </p:spPr>
+            <p:txBody>
+              <a:bodyPr/>
+              <a:lstStyle/>
+              <a:p>
+                <a:r>
+                  <a:rPr lang="fr-FR">
+                    <a:noFill/>
+                  </a:rPr>
+                  <a:t> </a:t>
+                </a:r>
+              </a:p>
+            </p:txBody>
+          </p:sp>
+        </mc:Fallback>
+      </mc:AlternateContent>
+      <mc:AlternateContent xmlns:mc="http://schemas.openxmlformats.org/markup-compatibility/2006">
+        <mc:Choice xmlns:a14="http://schemas.microsoft.com/office/drawing/2010/main" Requires="a14">
+          <p:sp>
+            <p:nvSpPr>
+              <p:cNvPr id="7" name="ZoneTexte 6">
+                <a:extLst>
+                  <a:ext uri="{FF2B5EF4-FFF2-40B4-BE49-F238E27FC236}">
+                    <a16:creationId xmlns:a16="http://schemas.microsoft.com/office/drawing/2014/main" id="{31C76483-FCF4-CCBD-44A0-CEE7F0FE8756}"/>
+                  </a:ext>
+                </a:extLst>
+              </p:cNvPr>
+              <p:cNvSpPr txBox="1"/>
+              <p:nvPr/>
+            </p:nvSpPr>
+            <p:spPr>
+              <a:xfrm>
+                <a:off x="478852" y="3760655"/>
+                <a:ext cx="10074030" cy="3016210"/>
+              </a:xfrm>
+              <a:prstGeom prst="rect">
+                <a:avLst/>
+              </a:prstGeom>
+              <a:noFill/>
+            </p:spPr>
+            <p:txBody>
+              <a:bodyPr wrap="square" rtlCol="0">
+                <a:spAutoFit/>
+              </a:bodyPr>
+              <a:lstStyle/>
+              <a:p>
+                <a:pPr algn="just">
+                  <a:spcAft>
+                    <a:spcPts val="600"/>
+                  </a:spcAft>
+                </a:pPr>
+                <a14:m>
+                  <m:oMath xmlns:m="http://schemas.openxmlformats.org/officeDocument/2006/math">
+                    <m:sSub>
+                      <m:sSubPr>
+                        <m:ctrlPr>
+                          <a:rPr lang="en-US" sz="2000" i="1" dirty="0" smtClean="0">
+                            <a:solidFill>
+                              <a:srgbClr val="0070C0"/>
+                            </a:solidFill>
+                            <a:latin typeface="Cambria Math" panose="02040503050406030204" pitchFamily="18" charset="0"/>
+                          </a:rPr>
+                        </m:ctrlPr>
+                      </m:sSubPr>
+                      <m:e>
+                        <m:r>
+                          <a:rPr lang="fr-FR" sz="2000" b="0" i="1" dirty="0" smtClean="0">
+                            <a:solidFill>
+                              <a:srgbClr val="0070C0"/>
+                            </a:solidFill>
+                            <a:latin typeface="Cambria Math" panose="02040503050406030204" pitchFamily="18" charset="0"/>
+                          </a:rPr>
+                          <m:t>𝑠</m:t>
+                        </m:r>
+                      </m:e>
+                      <m:sub>
+                        <m:r>
+                          <a:rPr lang="fr-FR" sz="2000" b="0" i="1" dirty="0" smtClean="0">
+                            <a:solidFill>
+                              <a:srgbClr val="0070C0"/>
+                            </a:solidFill>
+                            <a:latin typeface="Cambria Math" panose="02040503050406030204" pitchFamily="18" charset="0"/>
+                          </a:rPr>
+                          <m:t>𝑖</m:t>
+                        </m:r>
+                      </m:sub>
+                    </m:sSub>
+                  </m:oMath>
+                </a14:m>
+                <a:r>
+                  <a:rPr lang="en-US" sz="2000" b="0" dirty="0">
+                    <a:solidFill>
+                      <a:srgbClr val="0070C0"/>
+                    </a:solidFill>
+                  </a:rPr>
+                  <a:t> </a:t>
+                </a:r>
+                <a:r>
+                  <a:rPr lang="en-US" sz="2000" dirty="0"/>
+                  <a:t>: </a:t>
+                </a:r>
+                <a:r>
+                  <a:rPr lang="fr-FR" sz="2000" dirty="0"/>
+                  <a:t>un nœud ou coup donné dans l’arbre MCTS.</a:t>
+                </a:r>
+                <a:endParaRPr lang="fr-FR" sz="2000" i="1" dirty="0"/>
+              </a:p>
+              <a:p>
+                <a:pPr algn="just">
+                  <a:spcAft>
+                    <a:spcPts val="600"/>
+                  </a:spcAft>
+                </a:pPr>
+                <a14:m>
+                  <m:oMath xmlns:m="http://schemas.openxmlformats.org/officeDocument/2006/math">
+                    <m:sSub>
+                      <m:sSubPr>
+                        <m:ctrlPr>
+                          <a:rPr lang="en-US" sz="2000" i="1">
+                            <a:solidFill>
+                              <a:srgbClr val="00B050"/>
+                            </a:solidFill>
+                            <a:latin typeface="Cambria Math" panose="02040503050406030204" pitchFamily="18" charset="0"/>
+                          </a:rPr>
+                        </m:ctrlPr>
+                      </m:sSubPr>
+                      <m:e>
+                        <m:r>
+                          <a:rPr lang="fr-FR" sz="2000" i="1">
+                            <a:solidFill>
+                              <a:srgbClr val="00B050"/>
+                            </a:solidFill>
+                            <a:latin typeface="Cambria Math" panose="02040503050406030204" pitchFamily="18" charset="0"/>
+                          </a:rPr>
+                          <m:t>𝑤</m:t>
+                        </m:r>
+                      </m:e>
+                      <m:sub>
+                        <m:r>
+                          <a:rPr lang="fr-FR" sz="2000" i="1">
+                            <a:solidFill>
+                              <a:srgbClr val="00B050"/>
+                            </a:solidFill>
+                            <a:latin typeface="Cambria Math" panose="02040503050406030204" pitchFamily="18" charset="0"/>
+                          </a:rPr>
+                          <m:t>𝑖</m:t>
+                        </m:r>
+                      </m:sub>
+                    </m:sSub>
+                  </m:oMath>
+                </a14:m>
+                <a:r>
+                  <a:rPr lang="fr-FR" sz="2000" dirty="0"/>
+                  <a:t>: le score total de victoires pour le nœud </a:t>
+                </a:r>
+                <a14:m>
+                  <m:oMath xmlns:m="http://schemas.openxmlformats.org/officeDocument/2006/math">
+                    <m:sSub>
+                      <m:sSubPr>
+                        <m:ctrlPr>
+                          <a:rPr lang="en-US" sz="2000" i="1" dirty="0">
+                            <a:solidFill>
+                              <a:srgbClr val="0070C0"/>
+                            </a:solidFill>
+                            <a:latin typeface="Cambria Math" panose="02040503050406030204" pitchFamily="18" charset="0"/>
+                          </a:rPr>
+                        </m:ctrlPr>
+                      </m:sSubPr>
+                      <m:e>
+                        <m:r>
+                          <a:rPr lang="fr-FR" sz="2000" i="1" dirty="0">
+                            <a:solidFill>
+                              <a:srgbClr val="0070C0"/>
+                            </a:solidFill>
+                            <a:latin typeface="Cambria Math" panose="02040503050406030204" pitchFamily="18" charset="0"/>
+                          </a:rPr>
+                          <m:t>𝑠</m:t>
+                        </m:r>
+                      </m:e>
+                      <m:sub>
+                        <m:r>
+                          <a:rPr lang="fr-FR" sz="2000" i="1" dirty="0">
+                            <a:solidFill>
+                              <a:srgbClr val="0070C0"/>
+                            </a:solidFill>
+                            <a:latin typeface="Cambria Math" panose="02040503050406030204" pitchFamily="18" charset="0"/>
+                          </a:rPr>
+                          <m:t>𝑖</m:t>
+                        </m:r>
+                      </m:sub>
+                    </m:sSub>
+                    <m:r>
+                      <m:rPr>
+                        <m:nor/>
+                      </m:rPr>
+                      <a:rPr lang="fr-FR" sz="2000" dirty="0"/>
+                      <m:t>.</m:t>
+                    </m:r>
+                  </m:oMath>
+                </a14:m>
+                <a:endParaRPr lang="fr-FR" sz="2000" dirty="0"/>
+              </a:p>
+              <a:p>
+                <a:pPr algn="just">
+                  <a:spcAft>
+                    <a:spcPts val="600"/>
+                  </a:spcAft>
+                </a:pPr>
+                <a14:m>
+                  <m:oMath xmlns:m="http://schemas.openxmlformats.org/officeDocument/2006/math">
+                    <m:sSub>
+                      <m:sSubPr>
+                        <m:ctrlPr>
+                          <a:rPr lang="en-US" sz="2000" b="0" i="1" smtClean="0">
+                            <a:solidFill>
+                              <a:srgbClr val="00B050"/>
+                            </a:solidFill>
+                            <a:latin typeface="Cambria Math" panose="02040503050406030204" pitchFamily="18" charset="0"/>
+                          </a:rPr>
+                        </m:ctrlPr>
+                      </m:sSubPr>
+                      <m:e>
+                        <m:r>
+                          <a:rPr lang="fr-FR" sz="2000" b="0" i="1" smtClean="0">
+                            <a:solidFill>
+                              <a:srgbClr val="00B050"/>
+                            </a:solidFill>
+                            <a:latin typeface="Cambria Math" panose="02040503050406030204" pitchFamily="18" charset="0"/>
+                          </a:rPr>
+                          <m:t>𝑛</m:t>
+                        </m:r>
+                      </m:e>
+                      <m:sub>
+                        <m:r>
+                          <a:rPr lang="fr-FR" sz="2000" b="0" i="1" smtClean="0">
+                            <a:solidFill>
+                              <a:srgbClr val="00B050"/>
+                            </a:solidFill>
+                            <a:latin typeface="Cambria Math" panose="02040503050406030204" pitchFamily="18" charset="0"/>
+                          </a:rPr>
+                          <m:t>𝑖</m:t>
+                        </m:r>
+                      </m:sub>
+                    </m:sSub>
+                  </m:oMath>
+                </a14:m>
+                <a:r>
+                  <a:rPr lang="fr-FR" sz="2000" dirty="0"/>
+                  <a:t> : le nombre de fois que le nœud </a:t>
+                </a:r>
+                <a14:m>
+                  <m:oMath xmlns:m="http://schemas.openxmlformats.org/officeDocument/2006/math">
+                    <m:sSub>
+                      <m:sSubPr>
+                        <m:ctrlPr>
+                          <a:rPr lang="en-US" sz="2000" i="1" dirty="0">
+                            <a:solidFill>
+                              <a:srgbClr val="0070C0"/>
+                            </a:solidFill>
+                            <a:latin typeface="Cambria Math" panose="02040503050406030204" pitchFamily="18" charset="0"/>
+                          </a:rPr>
+                        </m:ctrlPr>
+                      </m:sSubPr>
+                      <m:e>
+                        <m:r>
+                          <a:rPr lang="fr-FR" sz="2000" i="1" dirty="0">
+                            <a:solidFill>
+                              <a:srgbClr val="0070C0"/>
+                            </a:solidFill>
+                            <a:latin typeface="Cambria Math" panose="02040503050406030204" pitchFamily="18" charset="0"/>
+                          </a:rPr>
+                          <m:t>𝑠</m:t>
+                        </m:r>
+                      </m:e>
+                      <m:sub>
+                        <m:r>
+                          <a:rPr lang="fr-FR" sz="2000" i="1" dirty="0">
+                            <a:solidFill>
+                              <a:srgbClr val="0070C0"/>
+                            </a:solidFill>
+                            <a:latin typeface="Cambria Math" panose="02040503050406030204" pitchFamily="18" charset="0"/>
+                          </a:rPr>
+                          <m:t>𝑖</m:t>
+                        </m:r>
+                      </m:sub>
+                    </m:sSub>
+                  </m:oMath>
+                </a14:m>
+                <a:r>
+                  <a:rPr lang="en-US" sz="2000" dirty="0">
+                    <a:solidFill>
+                      <a:srgbClr val="0070C0"/>
+                    </a:solidFill>
+                  </a:rPr>
+                  <a:t> </a:t>
+                </a:r>
+                <a:r>
+                  <a:rPr lang="fr-FR" sz="2000" dirty="0"/>
+                  <a:t>a été visité.</a:t>
+                </a:r>
+                <a:r>
+                  <a:rPr lang="en-US" sz="2000" dirty="0">
+                    <a:solidFill>
+                      <a:srgbClr val="0070C0"/>
+                    </a:solidFill>
+                  </a:rPr>
+                  <a:t> </a:t>
+                </a:r>
+                <a:endParaRPr lang="fr-FR" sz="2000" dirty="0"/>
+              </a:p>
+              <a:p>
+                <a:pPr algn="just">
+                  <a:spcAft>
+                    <a:spcPts val="600"/>
+                  </a:spcAft>
+                </a:pPr>
+                <a14:m>
+                  <m:oMath xmlns:m="http://schemas.openxmlformats.org/officeDocument/2006/math">
+                    <m:r>
+                      <a:rPr lang="fr-FR" sz="2000" i="1">
+                        <a:solidFill>
+                          <a:srgbClr val="FFC000"/>
+                        </a:solidFill>
+                        <a:latin typeface="Cambria Math" panose="02040503050406030204" pitchFamily="18" charset="0"/>
+                        <a:ea typeface="Cambria Math" panose="02040503050406030204" pitchFamily="18" charset="0"/>
+                      </a:rPr>
+                      <m:t>𝑁</m:t>
+                    </m:r>
+                  </m:oMath>
+                </a14:m>
+                <a:r>
+                  <a:rPr lang="fr-FR" sz="2000" dirty="0"/>
+                  <a:t>: le nombre total de visites du nœud parent de </a:t>
+                </a:r>
+                <a14:m>
+                  <m:oMath xmlns:m="http://schemas.openxmlformats.org/officeDocument/2006/math">
+                    <m:sSub>
+                      <m:sSubPr>
+                        <m:ctrlPr>
+                          <a:rPr lang="en-US" sz="2000" i="1" dirty="0">
+                            <a:solidFill>
+                              <a:srgbClr val="0070C0"/>
+                            </a:solidFill>
+                            <a:latin typeface="Cambria Math" panose="02040503050406030204" pitchFamily="18" charset="0"/>
+                          </a:rPr>
+                        </m:ctrlPr>
+                      </m:sSubPr>
+                      <m:e>
+                        <m:r>
+                          <a:rPr lang="fr-FR" sz="2000" i="1" dirty="0">
+                            <a:solidFill>
+                              <a:srgbClr val="0070C0"/>
+                            </a:solidFill>
+                            <a:latin typeface="Cambria Math" panose="02040503050406030204" pitchFamily="18" charset="0"/>
+                          </a:rPr>
+                          <m:t>𝑠</m:t>
+                        </m:r>
+                      </m:e>
+                      <m:sub>
+                        <m:r>
+                          <a:rPr lang="fr-FR" sz="2000" i="1" dirty="0">
+                            <a:solidFill>
+                              <a:srgbClr val="0070C0"/>
+                            </a:solidFill>
+                            <a:latin typeface="Cambria Math" panose="02040503050406030204" pitchFamily="18" charset="0"/>
+                          </a:rPr>
+                          <m:t>𝑖</m:t>
+                        </m:r>
+                      </m:sub>
+                    </m:sSub>
+                  </m:oMath>
+                </a14:m>
+                <a:r>
+                  <a:rPr lang="fr-FR" sz="2000" dirty="0"/>
+                  <a:t>.</a:t>
+                </a:r>
+              </a:p>
+              <a:p>
+                <a:pPr algn="just">
+                  <a:spcAft>
+                    <a:spcPts val="600"/>
+                  </a:spcAft>
+                </a:pPr>
+                <a14:m>
+                  <m:oMath xmlns:m="http://schemas.openxmlformats.org/officeDocument/2006/math">
+                    <m:r>
+                      <a:rPr lang="fr-FR" sz="2000" i="1">
+                        <a:solidFill>
+                          <a:srgbClr val="FFC000"/>
+                        </a:solidFill>
+                        <a:latin typeface="Cambria Math" panose="02040503050406030204" pitchFamily="18" charset="0"/>
+                      </a:rPr>
+                      <m:t>𝐶</m:t>
+                    </m:r>
+                    <m:r>
+                      <a:rPr lang="fr-FR" sz="2000" i="1">
+                        <a:solidFill>
+                          <a:srgbClr val="FFC000"/>
+                        </a:solidFill>
+                        <a:latin typeface="Cambria Math" panose="02040503050406030204" pitchFamily="18" charset="0"/>
+                      </a:rPr>
+                      <m:t> </m:t>
+                    </m:r>
+                  </m:oMath>
+                </a14:m>
+                <a:r>
+                  <a:rPr lang="fr-FR" sz="2000" dirty="0"/>
+                  <a:t>: le paramètre d’exploration qui équilibre l’exploration et l’exploitation.</a:t>
+                </a:r>
+              </a:p>
+              <a:p>
+                <a:pPr algn="just">
+                  <a:spcAft>
+                    <a:spcPts val="600"/>
+                  </a:spcAft>
+                </a:pPr>
+                <a:r>
+                  <a:rPr lang="fr-FR" sz="2000" dirty="0">
+                    <a:solidFill>
+                      <a:srgbClr val="00B050"/>
+                    </a:solidFill>
+                  </a:rPr>
+                  <a:t>Terme d’exploitation </a:t>
+                </a:r>
+                <a:r>
+                  <a:rPr lang="fr-FR" sz="2000" dirty="0"/>
+                  <a:t>: représente le taux de victoires moyen pour un nœud.</a:t>
+                </a:r>
+              </a:p>
+              <a:p>
+                <a:pPr algn="just">
+                  <a:spcAft>
+                    <a:spcPts val="600"/>
+                  </a:spcAft>
+                </a:pPr>
+                <a:r>
+                  <a:rPr lang="fr-FR" sz="2000" dirty="0">
+                    <a:solidFill>
+                      <a:srgbClr val="FFC000"/>
+                    </a:solidFill>
+                  </a:rPr>
+                  <a:t>Terme d’exploration </a:t>
+                </a:r>
+                <a:r>
+                  <a:rPr lang="fr-FR" sz="2000" dirty="0"/>
+                  <a:t>: encourage l’algorithme à explorer les nœuds moins visités en augmentant le score UTC pour les coups peu explorés.</a:t>
+                </a:r>
+              </a:p>
+            </p:txBody>
+          </p:sp>
+        </mc:Choice>
+        <mc:Fallback>
+          <p:sp>
+            <p:nvSpPr>
+              <p:cNvPr id="7" name="ZoneTexte 6">
+                <a:extLst>
+                  <a:ext uri="{FF2B5EF4-FFF2-40B4-BE49-F238E27FC236}">
+                    <a16:creationId xmlns:a16="http://schemas.microsoft.com/office/drawing/2014/main" id="{31C76483-FCF4-CCBD-44A0-CEE7F0FE8756}"/>
+                  </a:ext>
+                </a:extLst>
+              </p:cNvPr>
+              <p:cNvSpPr txBox="1">
+                <a:spLocks noRot="1" noChangeAspect="1" noMove="1" noResize="1" noEditPoints="1" noAdjustHandles="1" noChangeArrowheads="1" noChangeShapeType="1" noTextEdit="1"/>
+              </p:cNvSpPr>
+              <p:nvPr/>
+            </p:nvSpPr>
+            <p:spPr>
+              <a:xfrm>
+                <a:off x="478852" y="3760655"/>
+                <a:ext cx="10074030" cy="3016210"/>
+              </a:xfrm>
+              <a:prstGeom prst="rect">
+                <a:avLst/>
+              </a:prstGeom>
+              <a:blipFill>
+                <a:blip r:embed="rId3"/>
+                <a:stretch>
+                  <a:fillRect l="-666" t="-1212" r="-605" b="-2626"/>
+                </a:stretch>
+              </a:blipFill>
+            </p:spPr>
+            <p:txBody>
+              <a:bodyPr/>
+              <a:lstStyle/>
+              <a:p>
+                <a:r>
+                  <a:rPr lang="fr-FR">
+                    <a:noFill/>
+                  </a:rPr>
+                  <a:t> </a:t>
+                </a:r>
+              </a:p>
+            </p:txBody>
+          </p:sp>
+        </mc:Fallback>
+      </mc:AlternateContent>
+      <p:cxnSp>
+        <p:nvCxnSpPr>
+          <p:cNvPr id="8" name="Connecteur droit 7">
+            <a:extLst>
+              <a:ext uri="{FF2B5EF4-FFF2-40B4-BE49-F238E27FC236}">
+                <a16:creationId xmlns:a16="http://schemas.microsoft.com/office/drawing/2014/main" id="{C24BA6A5-31D6-16B6-2589-DCD684A32FFD}"/>
+              </a:ext>
+            </a:extLst>
+          </p:cNvPr>
+          <p:cNvCxnSpPr>
+            <a:cxnSpLocks/>
+          </p:cNvCxnSpPr>
+          <p:nvPr/>
+        </p:nvCxnSpPr>
+        <p:spPr>
+          <a:xfrm>
+            <a:off x="478852" y="3643525"/>
+            <a:ext cx="9991649" cy="0"/>
+          </a:xfrm>
+          <a:prstGeom prst="line">
+            <a:avLst/>
+          </a:prstGeom>
+          <a:ln w="19050"/>
+        </p:spPr>
+        <p:style>
+          <a:lnRef idx="1">
+            <a:schemeClr val="accent1"/>
+          </a:lnRef>
+          <a:fillRef idx="0">
+            <a:schemeClr val="accent1"/>
+          </a:fillRef>
+          <a:effectRef idx="0">
+            <a:schemeClr val="accent1"/>
+          </a:effectRef>
+          <a:fontRef idx="minor">
+            <a:schemeClr val="tx1"/>
+          </a:fontRef>
+        </p:style>
+      </p:cxnSp>
+    </p:spTree>
+    <p:extLst>
+      <p:ext uri="{BB962C8B-B14F-4D97-AF65-F5344CB8AC3E}">
+        <p14:creationId xmlns:p14="http://schemas.microsoft.com/office/powerpoint/2010/main" val="1551144347"/>
+      </p:ext>
+    </p:extLst>
+  </p:cSld>
+  <p:clrMapOvr>
+    <a:masterClrMapping/>
+  </p:clrMapOvr>
+</p:sld>
+</file>
+
+<file path=ppt/slides/slide18.xml><?xml version="1.0" encoding="utf-8"?>
+<p:sld xmlns:a="http://schemas.openxmlformats.org/drawingml/2006/main" xmlns:r="http://schemas.openxmlformats.org/officeDocument/2006/relationships" xmlns:p="http://schemas.openxmlformats.org/presentationml/2006/main">
+  <p:cSld>
+    <p:spTree>
+      <p:nvGrpSpPr>
+        <p:cNvPr id="1" name="">
+          <a:extLst>
+            <a:ext uri="{FF2B5EF4-FFF2-40B4-BE49-F238E27FC236}">
+              <a16:creationId xmlns:a16="http://schemas.microsoft.com/office/drawing/2014/main" id="{6A31BBAC-CCE3-3880-202B-96C0FF4E1E2C}"/>
+            </a:ext>
+          </a:extLst>
+        </p:cNvPr>
+        <p:cNvGrpSpPr/>
+        <p:nvPr/>
+      </p:nvGrpSpPr>
+      <p:grpSpPr>
+        <a:xfrm>
+          <a:off x="0" y="0"/>
+          <a:ext cx="0" cy="0"/>
+          <a:chOff x="0" y="0"/>
+          <a:chExt cx="0" cy="0"/>
+        </a:xfrm>
+      </p:grpSpPr>
+      <p:sp>
+        <p:nvSpPr>
+          <p:cNvPr id="2" name="Titre 1">
+            <a:extLst>
+              <a:ext uri="{FF2B5EF4-FFF2-40B4-BE49-F238E27FC236}">
+                <a16:creationId xmlns:a16="http://schemas.microsoft.com/office/drawing/2014/main" id="{E9F38F7F-1D66-24E6-50B7-C57CA1D16BD1}"/>
+              </a:ext>
+            </a:extLst>
+          </p:cNvPr>
+          <p:cNvSpPr>
+            <a:spLocks noGrp="1"/>
+          </p:cNvSpPr>
+          <p:nvPr>
+            <p:ph type="title"/>
+          </p:nvPr>
+        </p:nvSpPr>
+        <p:spPr>
+          <a:xfrm>
+            <a:off x="520045" y="355698"/>
+            <a:ext cx="10515600" cy="1325563"/>
+          </a:xfrm>
+        </p:spPr>
+        <p:txBody>
+          <a:bodyPr/>
+          <a:lstStyle/>
+          <a:p>
             <a:r>
               <a:rPr lang="en-US" b="1" dirty="0" err="1">
                 <a:latin typeface="Aharoni" panose="02010803020104030203" pitchFamily="2" charset="-79"/>
@@ -10333,7 +11348,7 @@
           <p:cNvPr id="4" name="Connecteur droit 3">
             <a:extLst>
               <a:ext uri="{FF2B5EF4-FFF2-40B4-BE49-F238E27FC236}">
-                <a16:creationId xmlns:a16="http://schemas.microsoft.com/office/drawing/2014/main" id="{EA0713B6-B49A-5F65-E66B-43D7FB988FA5}"/>
+                <a16:creationId xmlns:a16="http://schemas.microsoft.com/office/drawing/2014/main" id="{03539E96-C8C9-C393-C17C-2A126C8E9731}"/>
               </a:ext>
             </a:extLst>
           </p:cNvPr>
@@ -10370,7 +11385,7 @@
           <p:cNvPr id="5" name="ZoneTexte 4">
             <a:extLst>
               <a:ext uri="{FF2B5EF4-FFF2-40B4-BE49-F238E27FC236}">
-                <a16:creationId xmlns:a16="http://schemas.microsoft.com/office/drawing/2014/main" id="{CFA75C57-15BF-7022-F3F8-FD8101BCFD92}"/>
+                <a16:creationId xmlns:a16="http://schemas.microsoft.com/office/drawing/2014/main" id="{02F906D4-125D-043F-9037-800876ADA205}"/>
               </a:ext>
             </a:extLst>
           </p:cNvPr>
@@ -10380,7 +11395,7 @@
         <p:spPr>
           <a:xfrm>
             <a:off x="520044" y="1681261"/>
-            <a:ext cx="8846205" cy="4708981"/>
+            <a:ext cx="8846205" cy="1015663"/>
           </a:xfrm>
           <a:prstGeom prst="rect">
             <a:avLst/>
@@ -10402,84 +11417,6 @@
             </a:pPr>
             <a:r>
               <a:rPr lang="fr-FR" sz="2000" dirty="0"/>
-              <a:t>Les 4 phases de MCTS:</a:t>
-            </a:r>
-          </a:p>
-          <a:p>
-            <a:pPr marL="742950" lvl="1" indent="-285750">
-              <a:spcAft>
-                <a:spcPts val="2400"/>
-              </a:spcAft>
-              <a:buFont typeface="Arial" panose="020B0604020202020204" pitchFamily="34" charset="0"/>
-              <a:buChar char="•"/>
-            </a:pPr>
-            <a:r>
-              <a:rPr lang="fr-FR" sz="2000" dirty="0"/>
-              <a:t>Sélection</a:t>
-            </a:r>
-          </a:p>
-          <a:p>
-            <a:pPr marL="742950" lvl="1" indent="-285750">
-              <a:spcAft>
-                <a:spcPts val="2400"/>
-              </a:spcAft>
-              <a:buFont typeface="Arial" panose="020B0604020202020204" pitchFamily="34" charset="0"/>
-              <a:buChar char="•"/>
-            </a:pPr>
-            <a:r>
-              <a:rPr lang="fr-FR" sz="2000" dirty="0"/>
-              <a:t>Expansion</a:t>
-            </a:r>
-          </a:p>
-          <a:p>
-            <a:pPr marL="742950" lvl="1" indent="-285750">
-              <a:spcAft>
-                <a:spcPts val="2400"/>
-              </a:spcAft>
-              <a:buFont typeface="Arial" panose="020B0604020202020204" pitchFamily="34" charset="0"/>
-              <a:buChar char="•"/>
-            </a:pPr>
-            <a:r>
-              <a:rPr lang="fr-FR" sz="2000" dirty="0"/>
-              <a:t>Simulation</a:t>
-            </a:r>
-          </a:p>
-          <a:p>
-            <a:pPr marL="742950" lvl="1" indent="-285750">
-              <a:spcAft>
-                <a:spcPts val="2400"/>
-              </a:spcAft>
-              <a:buFont typeface="Arial" panose="020B0604020202020204" pitchFamily="34" charset="0"/>
-              <a:buChar char="•"/>
-            </a:pPr>
-            <a:r>
-              <a:rPr lang="fr-FR" sz="2000" dirty="0"/>
-              <a:t>Back propagation</a:t>
-            </a:r>
-          </a:p>
-          <a:p>
-            <a:pPr marL="285750" indent="-285750">
-              <a:spcAft>
-                <a:spcPts val="2400"/>
-              </a:spcAft>
-              <a:buFont typeface="Arial" panose="020B0604020202020204" pitchFamily="34" charset="0"/>
-              <a:buChar char="•"/>
-            </a:pPr>
-            <a:r>
-              <a:rPr lang="fr-FR" sz="2000" dirty="0"/>
-              <a:t>Stratégie UCT</a:t>
-            </a:r>
-          </a:p>
-          <a:p>
-            <a:pPr marL="285750" indent="-285750">
-              <a:spcAft>
-                <a:spcPts val="2400"/>
-              </a:spcAft>
-              <a:buFont typeface="Arial" panose="020B0604020202020204" pitchFamily="34" charset="0"/>
-              <a:buChar char="•"/>
-            </a:pPr>
-            <a:r>
-              <a:rPr lang="fr-FR" sz="2000" dirty="0"/>
               <a:t>Amélioration de l’exploration</a:t>
             </a:r>
           </a:p>
@@ -10502,7 +11439,7 @@
               <p:cNvPr id="3" name="ZoneTexte 2">
                 <a:extLst>
                   <a:ext uri="{FF2B5EF4-FFF2-40B4-BE49-F238E27FC236}">
-                    <a16:creationId xmlns:a16="http://schemas.microsoft.com/office/drawing/2014/main" id="{19F3D49F-9E9F-5849-89D8-4E1B9D16FF96}"/>
+                    <a16:creationId xmlns:a16="http://schemas.microsoft.com/office/drawing/2014/main" id="{BE132205-5CEE-79BA-5450-319D793844D4}"/>
                   </a:ext>
                 </a:extLst>
               </p:cNvPr>
@@ -10511,7 +11448,7 @@
             </p:nvSpPr>
             <p:spPr>
               <a:xfrm>
-                <a:off x="1768789" y="5566751"/>
+                <a:off x="956764" y="3414270"/>
                 <a:ext cx="9642162" cy="836191"/>
               </a:xfrm>
               <a:prstGeom prst="rect">
@@ -10525,6 +11462,7 @@
               </a:bodyPr>
               <a:lstStyle/>
               <a:p>
+                <a:pPr/>
                 <a14:m>
                   <m:oMathPara xmlns:m="http://schemas.openxmlformats.org/officeDocument/2006/math">
                     <m:oMathParaPr>
@@ -10692,7 +11630,7 @@
               <p:cNvPr id="3" name="ZoneTexte 2">
                 <a:extLst>
                   <a:ext uri="{FF2B5EF4-FFF2-40B4-BE49-F238E27FC236}">
-                    <a16:creationId xmlns:a16="http://schemas.microsoft.com/office/drawing/2014/main" id="{19F3D49F-9E9F-5849-89D8-4E1B9D16FF96}"/>
+                    <a16:creationId xmlns:a16="http://schemas.microsoft.com/office/drawing/2014/main" id="{BE132205-5CEE-79BA-5450-319D793844D4}"/>
                   </a:ext>
                 </a:extLst>
               </p:cNvPr>
@@ -10703,7 +11641,7 @@
             </p:nvSpPr>
             <p:spPr>
               <a:xfrm>
-                <a:off x="1768789" y="5566751"/>
+                <a:off x="956764" y="3414270"/>
                 <a:ext cx="9642162" cy="836191"/>
               </a:xfrm>
               <a:prstGeom prst="rect">
@@ -10734,7 +11672,7 @@
     </p:spTree>
     <p:extLst>
       <p:ext uri="{BB962C8B-B14F-4D97-AF65-F5344CB8AC3E}">
-        <p14:creationId xmlns:p14="http://schemas.microsoft.com/office/powerpoint/2010/main" val="2312240916"/>
+        <p14:creationId xmlns:p14="http://schemas.microsoft.com/office/powerpoint/2010/main" val="779555639"/>
       </p:ext>
     </p:extLst>
   </p:cSld>
@@ -10744,7 +11682,7 @@
 </p:sld>
 </file>
 
-<file path=ppt/slides/slide18.xml><?xml version="1.0" encoding="utf-8"?>
+<file path=ppt/slides/slide19.xml><?xml version="1.0" encoding="utf-8"?>
 <p:sld xmlns:a="http://schemas.openxmlformats.org/drawingml/2006/main" xmlns:r="http://schemas.openxmlformats.org/officeDocument/2006/relationships" xmlns:p="http://schemas.openxmlformats.org/presentationml/2006/main">
   <p:cSld>
     <p:spTree>

</xml_diff>